<commit_message>
objects and methods updated
</commit_message>
<xml_diff>
--- a/slides/On-Campus/02_02_ObjectsMethods.pptx
+++ b/slides/On-Campus/02_02_ObjectsMethods.pptx
@@ -228,7 +228,7 @@
           <a:p>
             <a:fld id="{4D7E51A5-B478-1E40-8CBB-0DAA8831E99D}" type="datetimeFigureOut">
               <a:rPr lang="en-US" smtClean="0"/>
-              <a:t>8/31/2021</a:t>
+              <a:t>9/1/2021</a:t>
             </a:fld>
             <a:endParaRPr lang="en-US"/>
           </a:p>
@@ -393,7 +393,7 @@
           <a:p>
             <a:fld id="{D0ED587F-861E-6740-9643-E3DDAE89B8D6}" type="datetimeFigureOut">
               <a:rPr lang="en-US" smtClean="0"/>
-              <a:t>8/31/2021</a:t>
+              <a:t>9/1/2021</a:t>
             </a:fld>
             <a:endParaRPr lang="en-US"/>
           </a:p>
@@ -8232,15 +8232,15 @@
             </a:r>
             <a:r>
               <a:rPr lang="en-US" dirty="0" smtClean="0"/>
-              <a:t>careful - </a:t>
-            </a:r>
-            <a:r>
-              <a:rPr lang="en-US" dirty="0" err="1" smtClean="0"/>
-              <a:t>Overllaping</a:t>
-            </a:r>
-            <a:r>
-              <a:rPr lang="en-US" dirty="0" smtClean="0"/>
-              <a:t>)</a:t>
+              <a:t>careful </a:t>
+            </a:r>
+            <a:r>
+              <a:rPr lang="en-US" smtClean="0"/>
+              <a:t>- </a:t>
+            </a:r>
+            <a:r>
+              <a:rPr lang="en-US" smtClean="0"/>
+              <a:t>Overlapping)</a:t>
             </a:r>
             <a:endParaRPr lang="en-US" dirty="0"/>
           </a:p>
@@ -10463,14 +10463,6 @@
               </a:rPr>
               <a:t>What does the method return?</a:t>
             </a:r>
-            <a:endParaRPr lang="en-US" dirty="0" smtClean="0">
-              <a:solidFill>
-                <a:srgbClr val="092529"/>
-              </a:solidFill>
-              <a:latin typeface="Proxima Nova" charset="0"/>
-              <a:ea typeface="Proxima Nova" charset="0"/>
-              <a:cs typeface="Proxima Nova" charset="0"/>
-            </a:endParaRPr>
           </a:p>
         </p:txBody>
       </p:sp>

</xml_diff>

<commit_message>
added practice 1 slide, moved a couple slides
</commit_message>
<xml_diff>
--- a/slides/On-Campus/02_02_ObjectsMethods.pptx
+++ b/slides/On-Campus/02_02_ObjectsMethods.pptx
@@ -5,10 +5,10 @@
     <p:sldMasterId id="2147483648" r:id="rId1"/>
   </p:sldMasterIdLst>
   <p:notesMasterIdLst>
-    <p:notesMasterId r:id="rId17"/>
+    <p:notesMasterId r:id="rId18"/>
   </p:notesMasterIdLst>
   <p:handoutMasterIdLst>
-    <p:handoutMasterId r:id="rId18"/>
+    <p:handoutMasterId r:id="rId19"/>
   </p:handoutMasterIdLst>
   <p:sldIdLst>
     <p:sldId id="256" r:id="rId2"/>
@@ -17,15 +17,16 @@
     <p:sldId id="272" r:id="rId5"/>
     <p:sldId id="266" r:id="rId6"/>
     <p:sldId id="267" r:id="rId7"/>
-    <p:sldId id="273" r:id="rId8"/>
-    <p:sldId id="258" r:id="rId9"/>
-    <p:sldId id="269" r:id="rId10"/>
-    <p:sldId id="262" r:id="rId11"/>
-    <p:sldId id="263" r:id="rId12"/>
-    <p:sldId id="264" r:id="rId13"/>
-    <p:sldId id="265" r:id="rId14"/>
-    <p:sldId id="274" r:id="rId15"/>
-    <p:sldId id="275" r:id="rId16"/>
+    <p:sldId id="258" r:id="rId8"/>
+    <p:sldId id="273" r:id="rId9"/>
+    <p:sldId id="276" r:id="rId10"/>
+    <p:sldId id="269" r:id="rId11"/>
+    <p:sldId id="262" r:id="rId12"/>
+    <p:sldId id="263" r:id="rId13"/>
+    <p:sldId id="264" r:id="rId14"/>
+    <p:sldId id="265" r:id="rId15"/>
+    <p:sldId id="274" r:id="rId16"/>
+    <p:sldId id="275" r:id="rId17"/>
   </p:sldIdLst>
   <p:sldSz cx="13817600" cy="7772400"/>
   <p:notesSz cx="6858000" cy="9144000"/>
@@ -228,7 +229,7 @@
           <a:p>
             <a:fld id="{4D7E51A5-B478-1E40-8CBB-0DAA8831E99D}" type="datetimeFigureOut">
               <a:rPr lang="en-US" smtClean="0"/>
-              <a:t>9/1/2021</a:t>
+              <a:t>9/1/21</a:t>
             </a:fld>
             <a:endParaRPr lang="en-US"/>
           </a:p>
@@ -393,7 +394,7 @@
           <a:p>
             <a:fld id="{D0ED587F-861E-6740-9643-E3DDAE89B8D6}" type="datetimeFigureOut">
               <a:rPr lang="en-US" smtClean="0"/>
-              <a:t>9/1/2021</a:t>
+              <a:t>9/1/21</a:t>
             </a:fld>
             <a:endParaRPr lang="en-US"/>
           </a:p>
@@ -7311,17 +7312,268 @@
       </p:transition>
     </mc:Fallback>
   </mc:AlternateContent>
+</p:sld>
+</file>
+
+<file path=ppt/slides/slide10.xml><?xml version="1.0" encoding="utf-8"?>
+<p:sld xmlns:a="http://schemas.openxmlformats.org/drawingml/2006/main" xmlns:r="http://schemas.openxmlformats.org/officeDocument/2006/relationships" xmlns:p="http://schemas.openxmlformats.org/presentationml/2006/main">
+  <p:cSld>
+    <p:spTree>
+      <p:nvGrpSpPr>
+        <p:cNvPr id="1" name=""/>
+        <p:cNvGrpSpPr/>
+        <p:nvPr/>
+      </p:nvGrpSpPr>
+      <p:grpSpPr>
+        <a:xfrm>
+          <a:off x="0" y="0"/>
+          <a:ext cx="0" cy="0"/>
+          <a:chOff x="0" y="0"/>
+          <a:chExt cx="0" cy="0"/>
+        </a:xfrm>
+      </p:grpSpPr>
+      <p:sp>
+        <p:nvSpPr>
+          <p:cNvPr id="2" name="Title 1">
+            <a:extLst>
+              <a:ext uri="{FF2B5EF4-FFF2-40B4-BE49-F238E27FC236}">
+                <a16:creationId xmlns:a16="http://schemas.microsoft.com/office/drawing/2014/main" id="{EAD74ED9-56BF-3F4A-8E26-0C10999B1A0C}"/>
+              </a:ext>
+            </a:extLst>
+          </p:cNvPr>
+          <p:cNvSpPr>
+            <a:spLocks noGrp="1"/>
+          </p:cNvSpPr>
+          <p:nvPr>
+            <p:ph type="title"/>
+          </p:nvPr>
+        </p:nvSpPr>
+        <p:spPr/>
+        <p:txBody>
+          <a:bodyPr/>
+          <a:lstStyle/>
+          <a:p>
+            <a:r>
+              <a:rPr lang="en-US" dirty="0"/>
+              <a:t>Reading Check-in </a:t>
+            </a:r>
+          </a:p>
+        </p:txBody>
+      </p:sp>
+      <p:sp>
+        <p:nvSpPr>
+          <p:cNvPr id="3" name="Text Placeholder 2">
+            <a:extLst>
+              <a:ext uri="{FF2B5EF4-FFF2-40B4-BE49-F238E27FC236}">
+                <a16:creationId xmlns:a16="http://schemas.microsoft.com/office/drawing/2014/main" id="{B28E42E1-569F-B347-A47A-1501D7874CF8}"/>
+              </a:ext>
+            </a:extLst>
+          </p:cNvPr>
+          <p:cNvSpPr>
+            <a:spLocks noGrp="1"/>
+          </p:cNvSpPr>
+          <p:nvPr>
+            <p:ph type="body" sz="quarter" idx="10"/>
+          </p:nvPr>
+        </p:nvSpPr>
+        <p:spPr>
+          <a:xfrm>
+            <a:off x="628075" y="2487883"/>
+            <a:ext cx="12561453" cy="3412601"/>
+          </a:xfrm>
+        </p:spPr>
+        <p:txBody>
+          <a:bodyPr/>
+          <a:lstStyle/>
+          <a:p>
+            <a:pPr marL="0" indent="0">
+              <a:buNone/>
+            </a:pPr>
+            <a:r>
+              <a:rPr lang="en-US" b="1" dirty="0"/>
+              <a:t>Which of the following are valid method “signatures”</a:t>
+            </a:r>
+          </a:p>
+          <a:p>
+            <a:pPr>
+              <a:buFont typeface="+mj-lt"/>
+              <a:buAutoNum type="alphaUcPeriod"/>
+            </a:pPr>
+            <a:r>
+              <a:rPr lang="en-US" dirty="0"/>
+              <a:t>public double </a:t>
+            </a:r>
+            <a:r>
+              <a:rPr lang="en-US" dirty="0" err="1"/>
+              <a:t>calcArea</a:t>
+            </a:r>
+            <a:r>
+              <a:rPr lang="en-US" dirty="0"/>
+              <a:t>(double width, double height) {}</a:t>
+            </a:r>
+          </a:p>
+          <a:p>
+            <a:pPr>
+              <a:buFont typeface="+mj-lt"/>
+              <a:buAutoNum type="alphaUcPeriod"/>
+            </a:pPr>
+            <a:r>
+              <a:rPr lang="en-US" dirty="0"/>
+              <a:t>Public static </a:t>
+            </a:r>
+            <a:r>
+              <a:rPr lang="en-US" dirty="0" err="1"/>
+              <a:t>my_method</a:t>
+            </a:r>
+            <a:r>
+              <a:rPr lang="en-US" dirty="0"/>
+              <a:t>(int x, boolean y) {}</a:t>
+            </a:r>
+          </a:p>
+          <a:p>
+            <a:pPr>
+              <a:buFont typeface="+mj-lt"/>
+              <a:buAutoNum type="alphaUcPeriod"/>
+            </a:pPr>
+            <a:r>
+              <a:rPr lang="en-US" dirty="0"/>
+              <a:t>public static void main(String </a:t>
+            </a:r>
+            <a:r>
+              <a:rPr lang="en-US" dirty="0" err="1"/>
+              <a:t>args</a:t>
+            </a:r>
+            <a:r>
+              <a:rPr lang="en-US" dirty="0"/>
+              <a:t>[]); </a:t>
+            </a:r>
+          </a:p>
+          <a:p>
+            <a:pPr>
+              <a:buFont typeface="+mj-lt"/>
+              <a:buAutoNum type="alphaUcPeriod"/>
+            </a:pPr>
+            <a:r>
+              <a:rPr lang="en-US" dirty="0"/>
+              <a:t> All listed</a:t>
+            </a:r>
+          </a:p>
+          <a:p>
+            <a:pPr>
+              <a:buFont typeface="+mj-lt"/>
+              <a:buAutoNum type="alphaUcPeriod"/>
+            </a:pPr>
+            <a:r>
+              <a:rPr lang="en-US" dirty="0"/>
+              <a:t> None listed </a:t>
+            </a:r>
+          </a:p>
+          <a:p>
+            <a:endParaRPr lang="en-US" dirty="0"/>
+          </a:p>
+        </p:txBody>
+      </p:sp>
+    </p:spTree>
+    <p:extLst>
+      <p:ext uri="{BB962C8B-B14F-4D97-AF65-F5344CB8AC3E}">
+        <p14:creationId xmlns:p14="http://schemas.microsoft.com/office/powerpoint/2010/main" val="547128411"/>
+      </p:ext>
+    </p:extLst>
+  </p:cSld>
+  <p:clrMapOvr>
+    <a:masterClrMapping/>
+  </p:clrMapOvr>
+  <mc:AlternateContent xmlns:mc="http://schemas.openxmlformats.org/markup-compatibility/2006" xmlns:p14="http://schemas.microsoft.com/office/powerpoint/2010/main">
+    <mc:Choice Requires="p14">
+      <p:transition p14:dur="300">
+        <p:fade/>
+      </p:transition>
+    </mc:Choice>
+    <mc:Fallback xmlns="">
+      <p:transition>
+        <p:fade/>
+      </p:transition>
+    </mc:Fallback>
+  </mc:AlternateContent>
   <p:timing>
     <p:tnLst>
       <p:par>
-        <p:cTn id="1" dur="indefinite" restart="never" nodeType="tmRoot"/>
+        <p:cTn id="1" dur="indefinite" restart="never" nodeType="tmRoot">
+          <p:childTnLst>
+            <p:seq concurrent="1" nextAc="seek">
+              <p:cTn id="2" dur="indefinite" nodeType="mainSeq">
+                <p:childTnLst>
+                  <p:par>
+                    <p:cTn id="3" fill="hold">
+                      <p:stCondLst>
+                        <p:cond delay="indefinite"/>
+                      </p:stCondLst>
+                      <p:childTnLst>
+                        <p:par>
+                          <p:cTn id="4" fill="hold">
+                            <p:stCondLst>
+                              <p:cond delay="0"/>
+                            </p:stCondLst>
+                            <p:childTnLst>
+                              <p:par>
+                                <p:cTn id="5" presetID="3" presetClass="emph" presetSubtype="2" fill="hold" nodeType="clickEffect">
+                                  <p:stCondLst>
+                                    <p:cond delay="0"/>
+                                  </p:stCondLst>
+                                  <p:childTnLst>
+                                    <p:animClr clrSpc="rgb" dir="cw">
+                                      <p:cBhvr override="childStyle">
+                                        <p:cTn id="6" dur="2000" fill="hold"/>
+                                        <p:tgtEl>
+                                          <p:spTgt spid="3">
+                                            <p:txEl>
+                                              <p:pRg st="1" end="1"/>
+                                            </p:txEl>
+                                          </p:spTgt>
+                                        </p:tgtEl>
+                                        <p:attrNameLst>
+                                          <p:attrName>style.color</p:attrName>
+                                        </p:attrNameLst>
+                                      </p:cBhvr>
+                                      <p:to>
+                                        <a:schemeClr val="accent1"/>
+                                      </p:to>
+                                    </p:animClr>
+                                  </p:childTnLst>
+                                </p:cTn>
+                              </p:par>
+                            </p:childTnLst>
+                          </p:cTn>
+                        </p:par>
+                      </p:childTnLst>
+                    </p:cTn>
+                  </p:par>
+                </p:childTnLst>
+              </p:cTn>
+              <p:prevCondLst>
+                <p:cond evt="onPrev" delay="0">
+                  <p:tgtEl>
+                    <p:sldTgt/>
+                  </p:tgtEl>
+                </p:cond>
+              </p:prevCondLst>
+              <p:nextCondLst>
+                <p:cond evt="onNext" delay="0">
+                  <p:tgtEl>
+                    <p:sldTgt/>
+                  </p:tgtEl>
+                </p:cond>
+              </p:nextCondLst>
+            </p:seq>
+          </p:childTnLst>
+        </p:cTn>
       </p:par>
     </p:tnLst>
   </p:timing>
 </p:sld>
 </file>
 
-<file path=ppt/slides/slide10.xml><?xml version="1.0" encoding="utf-8"?>
+<file path=ppt/slides/slide11.xml><?xml version="1.0" encoding="utf-8"?>
 <p:sld xmlns:a="http://schemas.openxmlformats.org/drawingml/2006/main" xmlns:r="http://schemas.openxmlformats.org/officeDocument/2006/relationships" xmlns:p="http://schemas.openxmlformats.org/presentationml/2006/main">
   <p:cSld>
     <p:spTree>
@@ -7861,17 +8113,10 @@
       </p:transition>
     </mc:Fallback>
   </mc:AlternateContent>
-  <p:timing>
-    <p:tnLst>
-      <p:par>
-        <p:cTn id="1" dur="indefinite" restart="never" nodeType="tmRoot"/>
-      </p:par>
-    </p:tnLst>
-  </p:timing>
 </p:sld>
 </file>
 
-<file path=ppt/slides/slide11.xml><?xml version="1.0" encoding="utf-8"?>
+<file path=ppt/slides/slide12.xml><?xml version="1.0" encoding="utf-8"?>
 <p:sld xmlns:a="http://schemas.openxmlformats.org/drawingml/2006/main" xmlns:r="http://schemas.openxmlformats.org/officeDocument/2006/relationships" xmlns:p="http://schemas.openxmlformats.org/presentationml/2006/main">
   <p:cSld>
     <p:spTree>
@@ -8056,17 +8301,10 @@
       </p:transition>
     </mc:Fallback>
   </mc:AlternateContent>
-  <p:timing>
-    <p:tnLst>
-      <p:par>
-        <p:cTn id="1" dur="indefinite" restart="never" nodeType="tmRoot"/>
-      </p:par>
-    </p:tnLst>
-  </p:timing>
 </p:sld>
 </file>
 
-<file path=ppt/slides/slide12.xml><?xml version="1.0" encoding="utf-8"?>
+<file path=ppt/slides/slide13.xml><?xml version="1.0" encoding="utf-8"?>
 <p:sld xmlns:a="http://schemas.openxmlformats.org/drawingml/2006/main" xmlns:r="http://schemas.openxmlformats.org/officeDocument/2006/relationships" xmlns:p="http://schemas.openxmlformats.org/presentationml/2006/main">
   <p:cSld>
     <p:spTree>
@@ -8228,19 +8466,11 @@
           <a:p>
             <a:r>
               <a:rPr lang="en-US" dirty="0"/>
-              <a:t>Are three different methods! (Be </a:t>
-            </a:r>
-            <a:r>
-              <a:rPr lang="en-US" dirty="0" smtClean="0"/>
-              <a:t>careful </a:t>
-            </a:r>
-            <a:r>
-              <a:rPr lang="en-US" smtClean="0"/>
-              <a:t>- </a:t>
-            </a:r>
-            <a:r>
-              <a:rPr lang="en-US" smtClean="0"/>
-              <a:t>Overlapping)</a:t>
+              <a:t>Are three different methods! (Be careful </a:t>
+            </a:r>
+            <a:r>
+              <a:rPr lang="en-US"/>
+              <a:t>- Overlapping)</a:t>
             </a:r>
             <a:endParaRPr lang="en-US" dirty="0"/>
           </a:p>
@@ -8758,7 +8988,7 @@
 </p:sld>
 </file>
 
-<file path=ppt/slides/slide13.xml><?xml version="1.0" encoding="utf-8"?>
+<file path=ppt/slides/slide14.xml><?xml version="1.0" encoding="utf-8"?>
 <p:sld xmlns:a="http://schemas.openxmlformats.org/drawingml/2006/main" xmlns:r="http://schemas.openxmlformats.org/officeDocument/2006/relationships" xmlns:p="http://schemas.openxmlformats.org/presentationml/2006/main">
   <p:cSld>
     <p:spTree>
@@ -8858,10 +9088,6 @@
             <a:br>
               <a:rPr lang="en-US" dirty="0"/>
             </a:br>
-            <a:r>
-              <a:rPr lang="en-US" dirty="0"/>
-              <a:t/>
-            </a:r>
             <a:br>
               <a:rPr lang="en-US" dirty="0"/>
             </a:br>
@@ -8999,14 +9225,6 @@
           </a:p>
           <a:p>
             <a:pPr algn="ctr"/>
-            <a:r>
-              <a:rPr lang="en-US" sz="1800" dirty="0">
-                <a:solidFill>
-                  <a:srgbClr val="092529"/>
-                </a:solidFill>
-              </a:rPr>
-              <a:t/>
-            </a:r>
             <a:br>
               <a:rPr lang="en-US" sz="1800" dirty="0">
                 <a:solidFill>
@@ -9340,7 +9558,7 @@
 </p:sld>
 </file>
 
-<file path=ppt/slides/slide14.xml><?xml version="1.0" encoding="utf-8"?>
+<file path=ppt/slides/slide15.xml><?xml version="1.0" encoding="utf-8"?>
 <p:sld xmlns:a="http://schemas.openxmlformats.org/drawingml/2006/main" xmlns:r="http://schemas.openxmlformats.org/officeDocument/2006/relationships" xmlns:p="http://schemas.openxmlformats.org/presentationml/2006/main">
   <p:cSld>
     <p:spTree>
@@ -9384,10 +9602,9 @@
           <a:lstStyle/>
           <a:p>
             <a:r>
-              <a:rPr lang="en-US" dirty="0" smtClean="0"/>
+              <a:rPr lang="en-US" dirty="0"/>
               <a:t>Code Along</a:t>
             </a:r>
-            <a:endParaRPr lang="en-US" dirty="0"/>
           </a:p>
         </p:txBody>
       </p:sp>
@@ -9594,21 +9811,21 @@
               <a:buNone/>
             </a:pPr>
             <a:r>
-              <a:rPr lang="en-US" sz="1400" dirty="0" smtClean="0">
+              <a:rPr lang="en-US" sz="1400" dirty="0">
                 <a:latin typeface="Courier New" panose="02070309020205020404" pitchFamily="49" charset="0"/>
                 <a:cs typeface="Courier New" panose="02070309020205020404" pitchFamily="49" charset="0"/>
               </a:rPr>
               <a:t>public class </a:t>
             </a:r>
             <a:r>
-              <a:rPr lang="en-US" sz="1400" dirty="0" err="1" smtClean="0">
+              <a:rPr lang="en-US" sz="1400" dirty="0" err="1">
                 <a:latin typeface="Courier New" panose="02070309020205020404" pitchFamily="49" charset="0"/>
                 <a:cs typeface="Courier New" panose="02070309020205020404" pitchFamily="49" charset="0"/>
               </a:rPr>
               <a:t>BasicCalculations</a:t>
             </a:r>
             <a:r>
-              <a:rPr lang="en-US" sz="1400" dirty="0" smtClean="0">
+              <a:rPr lang="en-US" sz="1400" dirty="0">
                 <a:latin typeface="Courier New" panose="02070309020205020404" pitchFamily="49" charset="0"/>
                 <a:cs typeface="Courier New" panose="02070309020205020404" pitchFamily="49" charset="0"/>
               </a:rPr>
@@ -9630,21 +9847,21 @@
               <a:buNone/>
             </a:pPr>
             <a:r>
-              <a:rPr lang="en-US" sz="1400" dirty="0" smtClean="0">
+              <a:rPr lang="en-US" sz="1400" dirty="0">
                 <a:latin typeface="Courier New" panose="02070309020205020404" pitchFamily="49" charset="0"/>
                 <a:cs typeface="Courier New" panose="02070309020205020404" pitchFamily="49" charset="0"/>
               </a:rPr>
               <a:t>   public static void main(String[] </a:t>
             </a:r>
             <a:r>
-              <a:rPr lang="en-US" sz="1400" dirty="0" err="1" smtClean="0">
+              <a:rPr lang="en-US" sz="1400" dirty="0" err="1">
                 <a:latin typeface="Courier New" panose="02070309020205020404" pitchFamily="49" charset="0"/>
                 <a:cs typeface="Courier New" panose="02070309020205020404" pitchFamily="49" charset="0"/>
               </a:rPr>
               <a:t>args</a:t>
             </a:r>
             <a:r>
-              <a:rPr lang="en-US" sz="1400" dirty="0" smtClean="0">
+              <a:rPr lang="en-US" sz="1400" dirty="0">
                 <a:latin typeface="Courier New" panose="02070309020205020404" pitchFamily="49" charset="0"/>
                 <a:cs typeface="Courier New" panose="02070309020205020404" pitchFamily="49" charset="0"/>
               </a:rPr>
@@ -9666,7 +9883,7 @@
               <a:buNone/>
             </a:pPr>
             <a:r>
-              <a:rPr lang="en-US" sz="1400" dirty="0" smtClean="0">
+              <a:rPr lang="en-US" sz="1400" dirty="0">
                 <a:latin typeface="Courier New" panose="02070309020205020404" pitchFamily="49" charset="0"/>
                 <a:cs typeface="Courier New" panose="02070309020205020404" pitchFamily="49" charset="0"/>
               </a:rPr>
@@ -9688,7 +9905,7 @@
               <a:buNone/>
             </a:pPr>
             <a:r>
-              <a:rPr lang="en-US" sz="1400" dirty="0" smtClean="0">
+              <a:rPr lang="en-US" sz="1400" dirty="0">
                 <a:latin typeface="Courier New" panose="02070309020205020404" pitchFamily="49" charset="0"/>
                 <a:cs typeface="Courier New" panose="02070309020205020404" pitchFamily="49" charset="0"/>
               </a:rPr>
@@ -9710,7 +9927,7 @@
               <a:buNone/>
             </a:pPr>
             <a:r>
-              <a:rPr lang="en-US" sz="1400" dirty="0" smtClean="0">
+              <a:rPr lang="en-US" sz="1400" dirty="0">
                 <a:latin typeface="Courier New" panose="02070309020205020404" pitchFamily="49" charset="0"/>
                 <a:cs typeface="Courier New" panose="02070309020205020404" pitchFamily="49" charset="0"/>
               </a:rPr>
@@ -9732,7 +9949,7 @@
               <a:buNone/>
             </a:pPr>
             <a:r>
-              <a:rPr lang="en-US" sz="1400" dirty="0" smtClean="0">
+              <a:rPr lang="en-US" sz="1400" dirty="0">
                 <a:latin typeface="Courier New" panose="02070309020205020404" pitchFamily="49" charset="0"/>
                 <a:cs typeface="Courier New" panose="02070309020205020404" pitchFamily="49" charset="0"/>
               </a:rPr>
@@ -9754,7 +9971,7 @@
               <a:buNone/>
             </a:pPr>
             <a:r>
-              <a:rPr lang="en-US" sz="1400" dirty="0" smtClean="0">
+              <a:rPr lang="en-US" sz="1400" dirty="0">
                 <a:latin typeface="Courier New" panose="02070309020205020404" pitchFamily="49" charset="0"/>
                 <a:cs typeface="Courier New" panose="02070309020205020404" pitchFamily="49" charset="0"/>
               </a:rPr>
@@ -9776,7 +9993,7 @@
               <a:buNone/>
             </a:pPr>
             <a:r>
-              <a:rPr lang="en-US" sz="1400" dirty="0" smtClean="0">
+              <a:rPr lang="en-US" sz="1400" dirty="0">
                 <a:latin typeface="Courier New" panose="02070309020205020404" pitchFamily="49" charset="0"/>
                 <a:cs typeface="Courier New" panose="02070309020205020404" pitchFamily="49" charset="0"/>
               </a:rPr>
@@ -9798,7 +10015,7 @@
               <a:buNone/>
             </a:pPr>
             <a:r>
-              <a:rPr lang="en-US" sz="1400" dirty="0" smtClean="0">
+              <a:rPr lang="en-US" sz="1400" dirty="0">
                 <a:latin typeface="Courier New" panose="02070309020205020404" pitchFamily="49" charset="0"/>
                 <a:cs typeface="Courier New" panose="02070309020205020404" pitchFamily="49" charset="0"/>
               </a:rPr>
@@ -9820,21 +10037,21 @@
               <a:buNone/>
             </a:pPr>
             <a:r>
-              <a:rPr lang="en-US" sz="1400" dirty="0" smtClean="0">
+              <a:rPr lang="en-US" sz="1400" dirty="0">
                 <a:latin typeface="Courier New" panose="02070309020205020404" pitchFamily="49" charset="0"/>
                 <a:cs typeface="Courier New" panose="02070309020205020404" pitchFamily="49" charset="0"/>
               </a:rPr>
               <a:t>      </a:t>
             </a:r>
             <a:r>
-              <a:rPr lang="en-US" sz="1400" dirty="0" err="1" smtClean="0">
+              <a:rPr lang="en-US" sz="1400" dirty="0" err="1">
                 <a:latin typeface="Courier New" panose="02070309020205020404" pitchFamily="49" charset="0"/>
                 <a:cs typeface="Courier New" panose="02070309020205020404" pitchFamily="49" charset="0"/>
               </a:rPr>
               <a:t>System.out.println</a:t>
             </a:r>
             <a:r>
-              <a:rPr lang="en-US" sz="1400" dirty="0" smtClean="0">
+              <a:rPr lang="en-US" sz="1400" dirty="0">
                 <a:latin typeface="Courier New" panose="02070309020205020404" pitchFamily="49" charset="0"/>
                 <a:cs typeface="Courier New" panose="02070309020205020404" pitchFamily="49" charset="0"/>
               </a:rPr>
@@ -9860,24 +10077,17 @@
                 <a:latin typeface="Courier New" panose="02070309020205020404" pitchFamily="49" charset="0"/>
                 <a:cs typeface="Courier New" panose="02070309020205020404" pitchFamily="49" charset="0"/>
               </a:rPr>
-              <a:t> </a:t>
-            </a:r>
-            <a:r>
-              <a:rPr lang="en-US" sz="1400" dirty="0" smtClean="0">
-                <a:latin typeface="Courier New" panose="02070309020205020404" pitchFamily="49" charset="0"/>
-                <a:cs typeface="Courier New" panose="02070309020205020404" pitchFamily="49" charset="0"/>
-              </a:rPr>
-              <a:t>     </a:t>
-            </a:r>
-            <a:r>
-              <a:rPr lang="en-US" sz="1400" dirty="0" err="1" smtClean="0">
+              <a:t>      </a:t>
+            </a:r>
+            <a:r>
+              <a:rPr lang="en-US" sz="1400" dirty="0" err="1">
                 <a:latin typeface="Courier New" panose="02070309020205020404" pitchFamily="49" charset="0"/>
                 <a:cs typeface="Courier New" panose="02070309020205020404" pitchFamily="49" charset="0"/>
               </a:rPr>
               <a:t>System.out.println</a:t>
             </a:r>
             <a:r>
-              <a:rPr lang="en-US" sz="1400" dirty="0" smtClean="0">
+              <a:rPr lang="en-US" sz="1400" dirty="0">
                 <a:latin typeface="Courier New" panose="02070309020205020404" pitchFamily="49" charset="0"/>
                 <a:cs typeface="Courier New" panose="02070309020205020404" pitchFamily="49" charset="0"/>
               </a:rPr>
@@ -9903,24 +10113,17 @@
                 <a:latin typeface="Courier New" panose="02070309020205020404" pitchFamily="49" charset="0"/>
                 <a:cs typeface="Courier New" panose="02070309020205020404" pitchFamily="49" charset="0"/>
               </a:rPr>
-              <a:t> </a:t>
-            </a:r>
-            <a:r>
-              <a:rPr lang="en-US" sz="1400" dirty="0" smtClean="0">
-                <a:latin typeface="Courier New" panose="02070309020205020404" pitchFamily="49" charset="0"/>
-                <a:cs typeface="Courier New" panose="02070309020205020404" pitchFamily="49" charset="0"/>
-              </a:rPr>
-              <a:t>     </a:t>
-            </a:r>
-            <a:r>
-              <a:rPr lang="en-US" sz="1400" dirty="0" err="1" smtClean="0">
+              <a:t>      </a:t>
+            </a:r>
+            <a:r>
+              <a:rPr lang="en-US" sz="1400" dirty="0" err="1">
                 <a:latin typeface="Courier New" panose="02070309020205020404" pitchFamily="49" charset="0"/>
                 <a:cs typeface="Courier New" panose="02070309020205020404" pitchFamily="49" charset="0"/>
               </a:rPr>
               <a:t>System.out.println</a:t>
             </a:r>
             <a:r>
-              <a:rPr lang="en-US" sz="1400" dirty="0" smtClean="0">
+              <a:rPr lang="en-US" sz="1400" dirty="0">
                 <a:latin typeface="Courier New" panose="02070309020205020404" pitchFamily="49" charset="0"/>
                 <a:cs typeface="Courier New" panose="02070309020205020404" pitchFamily="49" charset="0"/>
               </a:rPr>
@@ -9946,24 +10149,17 @@
                 <a:latin typeface="Courier New" panose="02070309020205020404" pitchFamily="49" charset="0"/>
                 <a:cs typeface="Courier New" panose="02070309020205020404" pitchFamily="49" charset="0"/>
               </a:rPr>
-              <a:t> </a:t>
-            </a:r>
-            <a:r>
-              <a:rPr lang="en-US" sz="1400" dirty="0" smtClean="0">
-                <a:latin typeface="Courier New" panose="02070309020205020404" pitchFamily="49" charset="0"/>
-                <a:cs typeface="Courier New" panose="02070309020205020404" pitchFamily="49" charset="0"/>
-              </a:rPr>
-              <a:t>     </a:t>
-            </a:r>
-            <a:r>
-              <a:rPr lang="en-US" sz="1400" dirty="0" err="1" smtClean="0">
+              <a:t>      </a:t>
+            </a:r>
+            <a:r>
+              <a:rPr lang="en-US" sz="1400" dirty="0" err="1">
                 <a:latin typeface="Courier New" panose="02070309020205020404" pitchFamily="49" charset="0"/>
                 <a:cs typeface="Courier New" panose="02070309020205020404" pitchFamily="49" charset="0"/>
               </a:rPr>
               <a:t>System.out.println</a:t>
             </a:r>
             <a:r>
-              <a:rPr lang="en-US" sz="1400" dirty="0" smtClean="0">
+              <a:rPr lang="en-US" sz="1400" dirty="0">
                 <a:latin typeface="Courier New" panose="02070309020205020404" pitchFamily="49" charset="0"/>
                 <a:cs typeface="Courier New" panose="02070309020205020404" pitchFamily="49" charset="0"/>
               </a:rPr>
@@ -9985,7 +10181,7 @@
               <a:buNone/>
             </a:pPr>
             <a:r>
-              <a:rPr lang="en-US" sz="1400" dirty="0" smtClean="0">
+              <a:rPr lang="en-US" sz="1400" dirty="0">
                 <a:latin typeface="Courier New" panose="02070309020205020404" pitchFamily="49" charset="0"/>
                 <a:cs typeface="Courier New" panose="02070309020205020404" pitchFamily="49" charset="0"/>
               </a:rPr>
@@ -10007,7 +10203,7 @@
               <a:buNone/>
             </a:pPr>
             <a:r>
-              <a:rPr lang="en-US" sz="1400" dirty="0" smtClean="0">
+              <a:rPr lang="en-US" sz="1400" dirty="0">
                 <a:latin typeface="Courier New" panose="02070309020205020404" pitchFamily="49" charset="0"/>
                 <a:cs typeface="Courier New" panose="02070309020205020404" pitchFamily="49" charset="0"/>
               </a:rPr>
@@ -10029,7 +10225,7 @@
               <a:buNone/>
             </a:pPr>
             <a:r>
-              <a:rPr lang="en-US" sz="1400" dirty="0" smtClean="0">
+              <a:rPr lang="en-US" sz="1400" dirty="0">
                 <a:latin typeface="Courier New" panose="02070309020205020404" pitchFamily="49" charset="0"/>
                 <a:cs typeface="Courier New" panose="02070309020205020404" pitchFamily="49" charset="0"/>
               </a:rPr>
@@ -10051,7 +10247,7 @@
               <a:buNone/>
             </a:pPr>
             <a:r>
-              <a:rPr lang="en-US" sz="1400" dirty="0" smtClean="0">
+              <a:rPr lang="en-US" sz="1400" dirty="0">
                 <a:latin typeface="Courier New" panose="02070309020205020404" pitchFamily="49" charset="0"/>
                 <a:cs typeface="Courier New" panose="02070309020205020404" pitchFamily="49" charset="0"/>
               </a:rPr>
@@ -10073,7 +10269,7 @@
               <a:buNone/>
             </a:pPr>
             <a:r>
-              <a:rPr lang="en-US" sz="1400" dirty="0" smtClean="0">
+              <a:rPr lang="en-US" sz="1400" dirty="0">
                 <a:latin typeface="Courier New" panose="02070309020205020404" pitchFamily="49" charset="0"/>
                 <a:cs typeface="Courier New" panose="02070309020205020404" pitchFamily="49" charset="0"/>
               </a:rPr>
@@ -10095,7 +10291,7 @@
               <a:buNone/>
             </a:pPr>
             <a:r>
-              <a:rPr lang="en-US" sz="1400" dirty="0" smtClean="0">
+              <a:rPr lang="en-US" sz="1400" dirty="0">
                 <a:latin typeface="Courier New" panose="02070309020205020404" pitchFamily="49" charset="0"/>
                 <a:cs typeface="Courier New" panose="02070309020205020404" pitchFamily="49" charset="0"/>
               </a:rPr>
@@ -10117,21 +10313,21 @@
               <a:buNone/>
             </a:pPr>
             <a:r>
-              <a:rPr lang="en-US" sz="1400" dirty="0" smtClean="0">
+              <a:rPr lang="en-US" sz="1400" dirty="0">
                 <a:latin typeface="Courier New" panose="02070309020205020404" pitchFamily="49" charset="0"/>
                 <a:cs typeface="Courier New" panose="02070309020205020404" pitchFamily="49" charset="0"/>
               </a:rPr>
               <a:t>      </a:t>
             </a:r>
             <a:r>
-              <a:rPr lang="en-US" sz="1400" dirty="0" err="1" smtClean="0">
+              <a:rPr lang="en-US" sz="1400" dirty="0" err="1">
                 <a:latin typeface="Courier New" panose="02070309020205020404" pitchFamily="49" charset="0"/>
                 <a:cs typeface="Courier New" panose="02070309020205020404" pitchFamily="49" charset="0"/>
               </a:rPr>
               <a:t>System.out.println</a:t>
             </a:r>
             <a:r>
-              <a:rPr lang="en-US" sz="1400" dirty="0" smtClean="0">
+              <a:rPr lang="en-US" sz="1400" dirty="0">
                 <a:latin typeface="Courier New" panose="02070309020205020404" pitchFamily="49" charset="0"/>
                 <a:cs typeface="Courier New" panose="02070309020205020404" pitchFamily="49" charset="0"/>
               </a:rPr>
@@ -10153,21 +10349,21 @@
               <a:buNone/>
             </a:pPr>
             <a:r>
-              <a:rPr lang="en-US" sz="1400" dirty="0" smtClean="0">
+              <a:rPr lang="en-US" sz="1400" dirty="0">
                 <a:latin typeface="Courier New" panose="02070309020205020404" pitchFamily="49" charset="0"/>
                 <a:cs typeface="Courier New" panose="02070309020205020404" pitchFamily="49" charset="0"/>
               </a:rPr>
               <a:t>      </a:t>
             </a:r>
             <a:r>
-              <a:rPr lang="en-US" sz="1400" dirty="0" err="1" smtClean="0">
+              <a:rPr lang="en-US" sz="1400" dirty="0" err="1">
                 <a:latin typeface="Courier New" panose="02070309020205020404" pitchFamily="49" charset="0"/>
                 <a:cs typeface="Courier New" panose="02070309020205020404" pitchFamily="49" charset="0"/>
               </a:rPr>
               <a:t>System.out.println</a:t>
             </a:r>
             <a:r>
-              <a:rPr lang="en-US" sz="1400" dirty="0" smtClean="0">
+              <a:rPr lang="en-US" sz="1400" dirty="0">
                 <a:latin typeface="Courier New" panose="02070309020205020404" pitchFamily="49" charset="0"/>
                 <a:cs typeface="Courier New" panose="02070309020205020404" pitchFamily="49" charset="0"/>
               </a:rPr>
@@ -10189,21 +10385,21 @@
               <a:buNone/>
             </a:pPr>
             <a:r>
-              <a:rPr lang="en-US" sz="1400" dirty="0" smtClean="0">
+              <a:rPr lang="en-US" sz="1400" dirty="0">
                 <a:latin typeface="Courier New" panose="02070309020205020404" pitchFamily="49" charset="0"/>
                 <a:cs typeface="Courier New" panose="02070309020205020404" pitchFamily="49" charset="0"/>
               </a:rPr>
               <a:t>      </a:t>
             </a:r>
             <a:r>
-              <a:rPr lang="en-US" sz="1400" dirty="0" err="1" smtClean="0">
+              <a:rPr lang="en-US" sz="1400" dirty="0" err="1">
                 <a:latin typeface="Courier New" panose="02070309020205020404" pitchFamily="49" charset="0"/>
                 <a:cs typeface="Courier New" panose="02070309020205020404" pitchFamily="49" charset="0"/>
               </a:rPr>
               <a:t>System.out.println</a:t>
             </a:r>
             <a:r>
-              <a:rPr lang="en-US" sz="1400" dirty="0" smtClean="0">
+              <a:rPr lang="en-US" sz="1400" dirty="0">
                 <a:latin typeface="Courier New" panose="02070309020205020404" pitchFamily="49" charset="0"/>
                 <a:cs typeface="Courier New" panose="02070309020205020404" pitchFamily="49" charset="0"/>
               </a:rPr>
@@ -10225,21 +10421,21 @@
               <a:buNone/>
             </a:pPr>
             <a:r>
-              <a:rPr lang="en-US" sz="1400" dirty="0" smtClean="0">
+              <a:rPr lang="en-US" sz="1400" dirty="0">
                 <a:latin typeface="Courier New" panose="02070309020205020404" pitchFamily="49" charset="0"/>
                 <a:cs typeface="Courier New" panose="02070309020205020404" pitchFamily="49" charset="0"/>
               </a:rPr>
               <a:t>      </a:t>
             </a:r>
             <a:r>
-              <a:rPr lang="en-US" sz="1400" dirty="0" err="1" smtClean="0">
+              <a:rPr lang="en-US" sz="1400" dirty="0" err="1">
                 <a:latin typeface="Courier New" panose="02070309020205020404" pitchFamily="49" charset="0"/>
                 <a:cs typeface="Courier New" panose="02070309020205020404" pitchFamily="49" charset="0"/>
               </a:rPr>
               <a:t>System.out.println</a:t>
             </a:r>
             <a:r>
-              <a:rPr lang="en-US" sz="1400" dirty="0" smtClean="0">
+              <a:rPr lang="en-US" sz="1400" dirty="0">
                 <a:latin typeface="Courier New" panose="02070309020205020404" pitchFamily="49" charset="0"/>
                 <a:cs typeface="Courier New" panose="02070309020205020404" pitchFamily="49" charset="0"/>
               </a:rPr>
@@ -10261,7 +10457,7 @@
               <a:buNone/>
             </a:pPr>
             <a:r>
-              <a:rPr lang="en-US" sz="1400" dirty="0" smtClean="0">
+              <a:rPr lang="en-US" sz="1400" dirty="0">
                 <a:latin typeface="Courier New" panose="02070309020205020404" pitchFamily="49" charset="0"/>
                 <a:cs typeface="Courier New" panose="02070309020205020404" pitchFamily="49" charset="0"/>
               </a:rPr>
@@ -10283,16 +10479,12 @@
               <a:buNone/>
             </a:pPr>
             <a:r>
-              <a:rPr lang="en-US" sz="1400" dirty="0" smtClean="0">
+              <a:rPr lang="en-US" sz="1400" dirty="0">
                 <a:latin typeface="Courier New" panose="02070309020205020404" pitchFamily="49" charset="0"/>
                 <a:cs typeface="Courier New" panose="02070309020205020404" pitchFamily="49" charset="0"/>
               </a:rPr>
               <a:t>}</a:t>
             </a:r>
-            <a:endParaRPr lang="en-US" sz="1400" dirty="0">
-              <a:latin typeface="Courier New" panose="02070309020205020404" pitchFamily="49" charset="0"/>
-              <a:cs typeface="Courier New" panose="02070309020205020404" pitchFamily="49" charset="0"/>
-            </a:endParaRPr>
           </a:p>
         </p:txBody>
       </p:sp>
@@ -10344,7 +10536,7 @@
           <a:p>
             <a:pPr algn="ctr"/>
             <a:r>
-              <a:rPr lang="en-US" dirty="0" smtClean="0">
+              <a:rPr lang="en-US" dirty="0">
                 <a:solidFill>
                   <a:srgbClr val="092529"/>
                 </a:solidFill>
@@ -10405,7 +10597,7 @@
           <a:p>
             <a:pPr algn="ctr"/>
             <a:r>
-              <a:rPr lang="en-US" dirty="0" smtClean="0">
+              <a:rPr lang="en-US" dirty="0">
                 <a:solidFill>
                   <a:srgbClr val="092529"/>
                 </a:solidFill>
@@ -10421,7 +10613,7 @@
               <a:buAutoNum type="arabicPeriod"/>
             </a:pPr>
             <a:r>
-              <a:rPr lang="en-US" dirty="0" smtClean="0">
+              <a:rPr lang="en-US" dirty="0">
                 <a:solidFill>
                   <a:srgbClr val="092529"/>
                 </a:solidFill>
@@ -10437,7 +10629,7 @@
               <a:buAutoNum type="arabicPeriod"/>
             </a:pPr>
             <a:r>
-              <a:rPr lang="en-US" dirty="0" smtClean="0">
+              <a:rPr lang="en-US" dirty="0">
                 <a:solidFill>
                   <a:srgbClr val="092529"/>
                 </a:solidFill>
@@ -10453,7 +10645,7 @@
               <a:buAutoNum type="arabicPeriod"/>
             </a:pPr>
             <a:r>
-              <a:rPr lang="en-US" dirty="0" smtClean="0">
+              <a:rPr lang="en-US" dirty="0">
                 <a:solidFill>
                   <a:srgbClr val="092529"/>
                 </a:solidFill>
@@ -10488,17 +10680,10 @@
       </p:transition>
     </mc:Fallback>
   </mc:AlternateContent>
-  <p:timing>
-    <p:tnLst>
-      <p:par>
-        <p:cTn id="1" dur="indefinite" restart="never" nodeType="tmRoot"/>
-      </p:par>
-    </p:tnLst>
-  </p:timing>
 </p:sld>
 </file>
 
-<file path=ppt/slides/slide15.xml><?xml version="1.0" encoding="utf-8"?>
+<file path=ppt/slides/slide16.xml><?xml version="1.0" encoding="utf-8"?>
 <p:sld xmlns:a="http://schemas.openxmlformats.org/drawingml/2006/main" xmlns:r="http://schemas.openxmlformats.org/officeDocument/2006/relationships" xmlns:p="http://schemas.openxmlformats.org/presentationml/2006/main">
   <p:cSld>
     <p:spTree>
@@ -10542,10 +10727,9 @@
           <a:lstStyle/>
           <a:p>
             <a:r>
-              <a:rPr lang="en-US" dirty="0" smtClean="0"/>
+              <a:rPr lang="en-US" dirty="0"/>
               <a:t>Code Along</a:t>
             </a:r>
-            <a:endParaRPr lang="en-US" dirty="0"/>
           </a:p>
         </p:txBody>
       </p:sp>
@@ -11578,7 +11762,7 @@
           <a:p>
             <a:pPr algn="ctr"/>
             <a:r>
-              <a:rPr lang="en-US" dirty="0" smtClean="0">
+              <a:rPr lang="en-US" dirty="0">
                 <a:solidFill>
                   <a:srgbClr val="092529"/>
                 </a:solidFill>
@@ -11672,7 +11856,7 @@
           <a:p>
             <a:pPr algn="ctr"/>
             <a:r>
-              <a:rPr lang="en-US" dirty="0" smtClean="0">
+              <a:rPr lang="en-US" dirty="0">
                 <a:solidFill>
                   <a:srgbClr val="092529"/>
                 </a:solidFill>
@@ -11799,7 +11983,7 @@
           <a:p>
             <a:pPr algn="ctr"/>
             <a:r>
-              <a:rPr lang="en-US" dirty="0" smtClean="0">
+              <a:rPr lang="en-US" dirty="0">
                 <a:solidFill>
                   <a:srgbClr val="092529"/>
                 </a:solidFill>
@@ -11813,7 +11997,7 @@
           <a:p>
             <a:pPr algn="ctr"/>
             <a:r>
-              <a:rPr lang="en-US" dirty="0" err="1" smtClean="0">
+              <a:rPr lang="en-US" dirty="0" err="1">
                 <a:solidFill>
                   <a:srgbClr val="092529"/>
                 </a:solidFill>
@@ -11823,7 +12007,7 @@
               </a:rPr>
               <a:t>subtractionMethod</a:t>
             </a:r>
-            <a:endParaRPr lang="en-US" dirty="0" smtClean="0">
+            <a:endParaRPr lang="en-US" dirty="0">
               <a:solidFill>
                 <a:srgbClr val="092529"/>
               </a:solidFill>
@@ -11835,7 +12019,7 @@
           <a:p>
             <a:pPr algn="ctr"/>
             <a:r>
-              <a:rPr lang="en-US" dirty="0" err="1" smtClean="0">
+              <a:rPr lang="en-US" dirty="0" err="1">
                 <a:solidFill>
                   <a:srgbClr val="092529"/>
                 </a:solidFill>
@@ -11845,7 +12029,7 @@
               </a:rPr>
               <a:t>multiplicationMethod</a:t>
             </a:r>
-            <a:endParaRPr lang="en-US" dirty="0" smtClean="0">
+            <a:endParaRPr lang="en-US" dirty="0">
               <a:solidFill>
                 <a:srgbClr val="092529"/>
               </a:solidFill>
@@ -11857,7 +12041,7 @@
           <a:p>
             <a:pPr algn="ctr"/>
             <a:r>
-              <a:rPr lang="en-US" dirty="0" err="1" smtClean="0">
+              <a:rPr lang="en-US" dirty="0" err="1">
                 <a:solidFill>
                   <a:srgbClr val="092529"/>
                 </a:solidFill>
@@ -11867,7 +12051,7 @@
               </a:rPr>
               <a:t>divisionMethod</a:t>
             </a:r>
-            <a:endParaRPr lang="en-US" dirty="0" smtClean="0">
+            <a:endParaRPr lang="en-US" dirty="0">
               <a:solidFill>
                 <a:srgbClr val="092529"/>
               </a:solidFill>
@@ -11879,7 +12063,7 @@
           <a:p>
             <a:pPr algn="ctr"/>
             <a:r>
-              <a:rPr lang="en-US" dirty="0" err="1" smtClean="0">
+              <a:rPr lang="en-US" dirty="0" err="1">
                 <a:solidFill>
                   <a:srgbClr val="092529"/>
                 </a:solidFill>
@@ -11889,7 +12073,7 @@
               </a:rPr>
               <a:t>printMethod</a:t>
             </a:r>
-            <a:endParaRPr lang="en-US" dirty="0" smtClean="0">
+            <a:endParaRPr lang="en-US" dirty="0">
               <a:solidFill>
                 <a:srgbClr val="092529"/>
               </a:solidFill>
@@ -12339,7 +12523,7 @@
         <p:spPr>
           <a:xfrm>
             <a:off x="10486045" y="3026858"/>
-            <a:ext cx="3207922" cy="3170099"/>
+            <a:ext cx="3207922" cy="2492990"/>
           </a:xfrm>
           <a:prstGeom prst="rect">
             <a:avLst/>
@@ -12359,21 +12543,17 @@
           </a:p>
           <a:p>
             <a:r>
-              <a:rPr lang="en-US" dirty="0"/>
+              <a:rPr lang="en-US" sz="1600" dirty="0"/>
               <a:t>Success in CS Panel</a:t>
             </a:r>
           </a:p>
           <a:p>
             <a:r>
-              <a:rPr lang="en-US" dirty="0"/>
+              <a:rPr lang="en-US" sz="1600" dirty="0"/>
               <a:t>Wednesday, 6:00 PM CSB 130</a:t>
             </a:r>
           </a:p>
           <a:p>
-            <a:r>
-              <a:rPr lang="en-US" dirty="0"/>
-              <a:t/>
-            </a:r>
             <a:br>
               <a:rPr lang="en-US" dirty="0"/>
             </a:br>
@@ -12384,29 +12564,79 @@
           </a:p>
           <a:p>
             <a:r>
+              <a:rPr lang="en-US" sz="1600" dirty="0"/>
+              <a:t>Hike to </a:t>
+            </a:r>
+            <a:r>
+              <a:rPr lang="en-US" sz="1600" dirty="0" err="1"/>
+              <a:t>Horsetooth</a:t>
+            </a:r>
+            <a:r>
+              <a:rPr lang="en-US" sz="1600" dirty="0"/>
+              <a:t> Falls</a:t>
+            </a:r>
+          </a:p>
+          <a:p>
+            <a:r>
+              <a:rPr lang="en-US" sz="1600" dirty="0"/>
+              <a:t>Thursday, 5:30 PM </a:t>
+            </a:r>
+            <a:br>
+              <a:rPr lang="en-US" sz="1600" dirty="0"/>
+            </a:br>
+            <a:r>
+              <a:rPr lang="en-US" sz="1600" dirty="0"/>
+              <a:t>Meet outside CSB front of building</a:t>
+            </a:r>
+          </a:p>
+        </p:txBody>
+      </p:sp>
+      <p:sp>
+        <p:nvSpPr>
+          <p:cNvPr id="2" name="TextBox 1">
+            <a:extLst>
+              <a:ext uri="{FF2B5EF4-FFF2-40B4-BE49-F238E27FC236}">
+                <a16:creationId xmlns:a16="http://schemas.microsoft.com/office/drawing/2014/main" id="{34DE5FA6-C9AA-7249-905D-C0AC1FB3A833}"/>
+              </a:ext>
+            </a:extLst>
+          </p:cNvPr>
+          <p:cNvSpPr txBox="1"/>
+          <p:nvPr/>
+        </p:nvSpPr>
+        <p:spPr>
+          <a:xfrm>
+            <a:off x="2450770" y="6082507"/>
+            <a:ext cx="9323386" cy="1015663"/>
+          </a:xfrm>
+          <a:prstGeom prst="rect">
+            <a:avLst/>
+          </a:prstGeom>
+          <a:solidFill>
+            <a:schemeClr val="accent2"/>
+          </a:solidFill>
+        </p:spPr>
+        <p:txBody>
+          <a:bodyPr wrap="none" rtlCol="0">
+            <a:spAutoFit/>
+          </a:bodyPr>
+          <a:lstStyle/>
+          <a:p>
+            <a:r>
+              <a:rPr lang="en-US" b="1" dirty="0"/>
+              <a:t>Opening Question: (make sure to talk before class starts)</a:t>
+            </a:r>
+          </a:p>
+          <a:p>
+            <a:r>
               <a:rPr lang="en-US" dirty="0"/>
-              <a:t>Hike to </a:t>
-            </a:r>
-            <a:r>
-              <a:rPr lang="en-US" dirty="0" err="1"/>
-              <a:t>Horsetooth</a:t>
-            </a:r>
-            <a:r>
-              <a:rPr lang="en-US" dirty="0"/>
-              <a:t> Falls</a:t>
-            </a:r>
-          </a:p>
-          <a:p>
-            <a:r>
-              <a:rPr lang="en-US" dirty="0"/>
-              <a:t>Thursday, 5:30 PM </a:t>
+              <a:t>What apps do you use most on your phone? What do they have in common?</a:t>
             </a:r>
             <a:br>
               <a:rPr lang="en-US" dirty="0"/>
             </a:br>
             <a:r>
               <a:rPr lang="en-US" dirty="0"/>
-              <a:t>Meet outside CSB front of building</a:t>
+              <a:t>What problem are they trying to solve? (also – do you know each other’s names!)</a:t>
             </a:r>
           </a:p>
         </p:txBody>
@@ -12424,13 +12654,6 @@
   <p:transition>
     <p:fade/>
   </p:transition>
-  <p:timing>
-    <p:tnLst>
-      <p:par>
-        <p:cTn id="1" dur="indefinite" restart="never" nodeType="tmRoot"/>
-      </p:par>
-    </p:tnLst>
-  </p:timing>
 </p:sld>
 </file>
 
@@ -12478,10 +12701,9 @@
           <a:lstStyle/>
           <a:p>
             <a:r>
-              <a:rPr lang="en-US" dirty="0" smtClean="0"/>
+              <a:rPr lang="en-US" dirty="0"/>
               <a:t>Programming == Problem Solving</a:t>
             </a:r>
-            <a:endParaRPr lang="en-US" dirty="0"/>
           </a:p>
         </p:txBody>
       </p:sp>
@@ -12513,12 +12735,8 @@
           <a:p>
             <a:pPr fontAlgn="base"/>
             <a:r>
-              <a:rPr lang="en-US" dirty="0" smtClean="0"/>
-              <a:t>You </a:t>
-            </a:r>
-            <a:r>
               <a:rPr lang="en-US" dirty="0"/>
-              <a:t>look at the problem to solve</a:t>
+              <a:t>You look at the problem to solve</a:t>
             </a:r>
           </a:p>
           <a:p>
@@ -12560,11 +12778,7 @@
             <a:pPr fontAlgn="base"/>
             <a:r>
               <a:rPr lang="en-US" dirty="0"/>
-              <a:t>Completed </a:t>
-            </a:r>
-            <a:r>
-              <a:rPr lang="en-US" dirty="0" smtClean="0"/>
-              <a:t>program</a:t>
+              <a:t>Completed program</a:t>
             </a:r>
           </a:p>
           <a:p>
@@ -12783,21 +12997,21 @@
               <a:buNone/>
             </a:pPr>
             <a:r>
-              <a:rPr lang="en-US" dirty="0" smtClean="0">
+              <a:rPr lang="en-US" dirty="0">
                 <a:latin typeface="Courier New" panose="02070309020205020404" pitchFamily="49" charset="0"/>
                 <a:cs typeface="Courier New" panose="02070309020205020404" pitchFamily="49" charset="0"/>
               </a:rPr>
               <a:t>public class </a:t>
             </a:r>
             <a:r>
-              <a:rPr lang="en-US" dirty="0" err="1" smtClean="0">
+              <a:rPr lang="en-US" dirty="0" err="1">
                 <a:latin typeface="Courier New" panose="02070309020205020404" pitchFamily="49" charset="0"/>
                 <a:cs typeface="Courier New" panose="02070309020205020404" pitchFamily="49" charset="0"/>
               </a:rPr>
               <a:t>BasicCalculations</a:t>
             </a:r>
             <a:r>
-              <a:rPr lang="en-US" dirty="0" smtClean="0">
+              <a:rPr lang="en-US" dirty="0">
                 <a:latin typeface="Courier New" panose="02070309020205020404" pitchFamily="49" charset="0"/>
                 <a:cs typeface="Courier New" panose="02070309020205020404" pitchFamily="49" charset="0"/>
               </a:rPr>
@@ -12819,21 +13033,21 @@
               <a:buNone/>
             </a:pPr>
             <a:r>
-              <a:rPr lang="en-US" dirty="0" smtClean="0">
+              <a:rPr lang="en-US" dirty="0">
                 <a:latin typeface="Courier New" panose="02070309020205020404" pitchFamily="49" charset="0"/>
                 <a:cs typeface="Courier New" panose="02070309020205020404" pitchFamily="49" charset="0"/>
               </a:rPr>
               <a:t>   public static void main(String[] </a:t>
             </a:r>
             <a:r>
-              <a:rPr lang="en-US" dirty="0" err="1" smtClean="0">
+              <a:rPr lang="en-US" dirty="0" err="1">
                 <a:latin typeface="Courier New" panose="02070309020205020404" pitchFamily="49" charset="0"/>
                 <a:cs typeface="Courier New" panose="02070309020205020404" pitchFamily="49" charset="0"/>
               </a:rPr>
               <a:t>args</a:t>
             </a:r>
             <a:r>
-              <a:rPr lang="en-US" dirty="0" smtClean="0">
+              <a:rPr lang="en-US" dirty="0">
                 <a:latin typeface="Courier New" panose="02070309020205020404" pitchFamily="49" charset="0"/>
                 <a:cs typeface="Courier New" panose="02070309020205020404" pitchFamily="49" charset="0"/>
               </a:rPr>
@@ -12855,7 +13069,7 @@
               <a:buNone/>
             </a:pPr>
             <a:r>
-              <a:rPr lang="en-US" dirty="0" smtClean="0">
+              <a:rPr lang="en-US" dirty="0">
                 <a:latin typeface="Courier New" panose="02070309020205020404" pitchFamily="49" charset="0"/>
                 <a:cs typeface="Courier New" panose="02070309020205020404" pitchFamily="49" charset="0"/>
               </a:rPr>
@@ -12881,14 +13095,7 @@
                 <a:latin typeface="Courier New" panose="02070309020205020404" pitchFamily="49" charset="0"/>
                 <a:cs typeface="Courier New" panose="02070309020205020404" pitchFamily="49" charset="0"/>
               </a:rPr>
-              <a:t> </a:t>
-            </a:r>
-            <a:r>
-              <a:rPr lang="en-US" dirty="0" smtClean="0">
-                <a:latin typeface="Courier New" panose="02070309020205020404" pitchFamily="49" charset="0"/>
-                <a:cs typeface="Courier New" panose="02070309020205020404" pitchFamily="49" charset="0"/>
-              </a:rPr>
-              <a:t>     double multiplication, division;</a:t>
+              <a:t>      double multiplication, division;</a:t>
             </a:r>
           </a:p>
           <a:p>
@@ -12906,7 +13113,7 @@
               <a:buNone/>
             </a:pPr>
             <a:r>
-              <a:rPr lang="en-US" dirty="0" smtClean="0">
+              <a:rPr lang="en-US" dirty="0">
                 <a:latin typeface="Courier New" panose="02070309020205020404" pitchFamily="49" charset="0"/>
                 <a:cs typeface="Courier New" panose="02070309020205020404" pitchFamily="49" charset="0"/>
               </a:rPr>
@@ -12928,7 +13135,7 @@
               <a:buNone/>
             </a:pPr>
             <a:r>
-              <a:rPr lang="en-US" dirty="0" smtClean="0">
+              <a:rPr lang="en-US" dirty="0">
                 <a:latin typeface="Courier New" panose="02070309020205020404" pitchFamily="49" charset="0"/>
                 <a:cs typeface="Courier New" panose="02070309020205020404" pitchFamily="49" charset="0"/>
               </a:rPr>
@@ -12950,7 +13157,7 @@
               <a:buNone/>
             </a:pPr>
             <a:r>
-              <a:rPr lang="en-US" dirty="0" smtClean="0">
+              <a:rPr lang="en-US" dirty="0">
                 <a:latin typeface="Courier New" panose="02070309020205020404" pitchFamily="49" charset="0"/>
                 <a:cs typeface="Courier New" panose="02070309020205020404" pitchFamily="49" charset="0"/>
               </a:rPr>
@@ -12972,7 +13179,7 @@
               <a:buNone/>
             </a:pPr>
             <a:r>
-              <a:rPr lang="en-US" dirty="0" smtClean="0">
+              <a:rPr lang="en-US" dirty="0">
                 <a:latin typeface="Courier New" panose="02070309020205020404" pitchFamily="49" charset="0"/>
                 <a:cs typeface="Courier New" panose="02070309020205020404" pitchFamily="49" charset="0"/>
               </a:rPr>
@@ -12994,7 +13201,7 @@
               <a:buNone/>
             </a:pPr>
             <a:r>
-              <a:rPr lang="en-US" dirty="0" smtClean="0">
+              <a:rPr lang="en-US" dirty="0">
                 <a:latin typeface="Courier New" panose="02070309020205020404" pitchFamily="49" charset="0"/>
                 <a:cs typeface="Courier New" panose="02070309020205020404" pitchFamily="49" charset="0"/>
               </a:rPr>
@@ -13016,7 +13223,7 @@
               <a:buNone/>
             </a:pPr>
             <a:r>
-              <a:rPr lang="en-US" dirty="0" smtClean="0">
+              <a:rPr lang="en-US" dirty="0">
                 <a:latin typeface="Courier New" panose="02070309020205020404" pitchFamily="49" charset="0"/>
                 <a:cs typeface="Courier New" panose="02070309020205020404" pitchFamily="49" charset="0"/>
               </a:rPr>
@@ -13038,21 +13245,21 @@
               <a:buNone/>
             </a:pPr>
             <a:r>
-              <a:rPr lang="en-US" dirty="0" smtClean="0">
+              <a:rPr lang="en-US" dirty="0">
                 <a:latin typeface="Courier New" panose="02070309020205020404" pitchFamily="49" charset="0"/>
                 <a:cs typeface="Courier New" panose="02070309020205020404" pitchFamily="49" charset="0"/>
               </a:rPr>
               <a:t>      </a:t>
             </a:r>
             <a:r>
-              <a:rPr lang="en-US" dirty="0" err="1" smtClean="0">
+              <a:rPr lang="en-US" dirty="0" err="1">
                 <a:latin typeface="Courier New" panose="02070309020205020404" pitchFamily="49" charset="0"/>
                 <a:cs typeface="Courier New" panose="02070309020205020404" pitchFamily="49" charset="0"/>
               </a:rPr>
               <a:t>System.out.println</a:t>
             </a:r>
             <a:r>
-              <a:rPr lang="en-US" dirty="0" smtClean="0">
+              <a:rPr lang="en-US" dirty="0">
                 <a:latin typeface="Courier New" panose="02070309020205020404" pitchFamily="49" charset="0"/>
                 <a:cs typeface="Courier New" panose="02070309020205020404" pitchFamily="49" charset="0"/>
               </a:rPr>
@@ -13078,14 +13285,7 @@
                 <a:latin typeface="Courier New" panose="02070309020205020404" pitchFamily="49" charset="0"/>
                 <a:cs typeface="Courier New" panose="02070309020205020404" pitchFamily="49" charset="0"/>
               </a:rPr>
-              <a:t> </a:t>
-            </a:r>
-            <a:r>
-              <a:rPr lang="en-US" dirty="0" smtClean="0">
-                <a:latin typeface="Courier New" panose="02070309020205020404" pitchFamily="49" charset="0"/>
-                <a:cs typeface="Courier New" panose="02070309020205020404" pitchFamily="49" charset="0"/>
-              </a:rPr>
-              <a:t>                        value2 + " = " + sum); </a:t>
+              <a:t>                         value2 + " = " + sum); </a:t>
             </a:r>
           </a:p>
           <a:p>
@@ -13103,21 +13303,21 @@
               <a:buNone/>
             </a:pPr>
             <a:r>
-              <a:rPr lang="en-US" dirty="0" smtClean="0">
+              <a:rPr lang="en-US" dirty="0">
                 <a:latin typeface="Courier New" panose="02070309020205020404" pitchFamily="49" charset="0"/>
                 <a:cs typeface="Courier New" panose="02070309020205020404" pitchFamily="49" charset="0"/>
               </a:rPr>
               <a:t>	 </a:t>
             </a:r>
             <a:r>
-              <a:rPr lang="en-US" dirty="0" err="1" smtClean="0">
+              <a:rPr lang="en-US" dirty="0" err="1">
                 <a:latin typeface="Courier New" panose="02070309020205020404" pitchFamily="49" charset="0"/>
                 <a:cs typeface="Courier New" panose="02070309020205020404" pitchFamily="49" charset="0"/>
               </a:rPr>
               <a:t>System.out.println</a:t>
             </a:r>
             <a:r>
-              <a:rPr lang="en-US" dirty="0" smtClean="0">
+              <a:rPr lang="en-US" dirty="0">
                 <a:latin typeface="Courier New" panose="02070309020205020404" pitchFamily="49" charset="0"/>
                 <a:cs typeface="Courier New" panose="02070309020205020404" pitchFamily="49" charset="0"/>
               </a:rPr>
@@ -13143,14 +13343,7 @@
                 <a:latin typeface="Courier New" panose="02070309020205020404" pitchFamily="49" charset="0"/>
                 <a:cs typeface="Courier New" panose="02070309020205020404" pitchFamily="49" charset="0"/>
               </a:rPr>
-              <a:t> </a:t>
-            </a:r>
-            <a:r>
-              <a:rPr lang="en-US" dirty="0" smtClean="0">
-                <a:latin typeface="Courier New" panose="02070309020205020404" pitchFamily="49" charset="0"/>
-                <a:cs typeface="Courier New" panose="02070309020205020404" pitchFamily="49" charset="0"/>
-              </a:rPr>
-              <a:t>                        value2 + " = " + subtraction); </a:t>
+              <a:t>                         value2 + " = " + subtraction); </a:t>
             </a:r>
           </a:p>
           <a:p>
@@ -13168,21 +13361,21 @@
               <a:buNone/>
             </a:pPr>
             <a:r>
-              <a:rPr lang="en-US" dirty="0" smtClean="0">
+              <a:rPr lang="en-US" dirty="0">
                 <a:latin typeface="Courier New" panose="02070309020205020404" pitchFamily="49" charset="0"/>
                 <a:cs typeface="Courier New" panose="02070309020205020404" pitchFamily="49" charset="0"/>
               </a:rPr>
               <a:t>	 </a:t>
             </a:r>
             <a:r>
-              <a:rPr lang="en-US" dirty="0" err="1" smtClean="0">
+              <a:rPr lang="en-US" dirty="0" err="1">
                 <a:latin typeface="Courier New" panose="02070309020205020404" pitchFamily="49" charset="0"/>
                 <a:cs typeface="Courier New" panose="02070309020205020404" pitchFamily="49" charset="0"/>
               </a:rPr>
               <a:t>System.out.println</a:t>
             </a:r>
             <a:r>
-              <a:rPr lang="en-US" dirty="0" smtClean="0">
+              <a:rPr lang="en-US" dirty="0">
                 <a:latin typeface="Courier New" panose="02070309020205020404" pitchFamily="49" charset="0"/>
                 <a:cs typeface="Courier New" panose="02070309020205020404" pitchFamily="49" charset="0"/>
               </a:rPr>
@@ -13208,14 +13401,7 @@
                 <a:latin typeface="Courier New" panose="02070309020205020404" pitchFamily="49" charset="0"/>
                 <a:cs typeface="Courier New" panose="02070309020205020404" pitchFamily="49" charset="0"/>
               </a:rPr>
-              <a:t> </a:t>
-            </a:r>
-            <a:r>
-              <a:rPr lang="en-US" dirty="0" smtClean="0">
-                <a:latin typeface="Courier New" panose="02070309020205020404" pitchFamily="49" charset="0"/>
-                <a:cs typeface="Courier New" panose="02070309020205020404" pitchFamily="49" charset="0"/>
-              </a:rPr>
-              <a:t>                        value2 + " = " + multiplication);</a:t>
+              <a:t>                         value2 + " = " + multiplication);</a:t>
             </a:r>
           </a:p>
           <a:p>
@@ -13233,21 +13419,21 @@
               <a:buNone/>
             </a:pPr>
             <a:r>
-              <a:rPr lang="en-US" dirty="0" smtClean="0">
+              <a:rPr lang="en-US" dirty="0">
                 <a:latin typeface="Courier New" panose="02070309020205020404" pitchFamily="49" charset="0"/>
                 <a:cs typeface="Courier New" panose="02070309020205020404" pitchFamily="49" charset="0"/>
               </a:rPr>
               <a:t>	 </a:t>
             </a:r>
             <a:r>
-              <a:rPr lang="en-US" dirty="0" err="1" smtClean="0">
+              <a:rPr lang="en-US" dirty="0" err="1">
                 <a:latin typeface="Courier New" panose="02070309020205020404" pitchFamily="49" charset="0"/>
                 <a:cs typeface="Courier New" panose="02070309020205020404" pitchFamily="49" charset="0"/>
               </a:rPr>
               <a:t>System.out.println</a:t>
             </a:r>
             <a:r>
-              <a:rPr lang="en-US" dirty="0" smtClean="0">
+              <a:rPr lang="en-US" dirty="0">
                 <a:latin typeface="Courier New" panose="02070309020205020404" pitchFamily="49" charset="0"/>
                 <a:cs typeface="Courier New" panose="02070309020205020404" pitchFamily="49" charset="0"/>
               </a:rPr>
@@ -13273,14 +13459,7 @@
                 <a:latin typeface="Courier New" panose="02070309020205020404" pitchFamily="49" charset="0"/>
                 <a:cs typeface="Courier New" panose="02070309020205020404" pitchFamily="49" charset="0"/>
               </a:rPr>
-              <a:t> </a:t>
-            </a:r>
-            <a:r>
-              <a:rPr lang="en-US" dirty="0" smtClean="0">
-                <a:latin typeface="Courier New" panose="02070309020205020404" pitchFamily="49" charset="0"/>
-                <a:cs typeface="Courier New" panose="02070309020205020404" pitchFamily="49" charset="0"/>
-              </a:rPr>
-              <a:t>                        value2 + " = " + division);</a:t>
+              <a:t>                         value2 + " = " + division);</a:t>
             </a:r>
           </a:p>
           <a:p>
@@ -13298,7 +13477,7 @@
               <a:buNone/>
             </a:pPr>
             <a:r>
-              <a:rPr lang="en-US" dirty="0" smtClean="0">
+              <a:rPr lang="en-US" dirty="0">
                 <a:latin typeface="Courier New" panose="02070309020205020404" pitchFamily="49" charset="0"/>
                 <a:cs typeface="Courier New" panose="02070309020205020404" pitchFamily="49" charset="0"/>
               </a:rPr>
@@ -13326,10 +13505,6 @@
               </a:rPr>
               <a:t>}</a:t>
             </a:r>
-            <a:endParaRPr lang="en-US" dirty="0" smtClean="0">
-              <a:latin typeface="Courier New" panose="02070309020205020404" pitchFamily="49" charset="0"/>
-              <a:cs typeface="Courier New" panose="02070309020205020404" pitchFamily="49" charset="0"/>
-            </a:endParaRPr>
           </a:p>
         </p:txBody>
       </p:sp>
@@ -13381,7 +13556,7 @@
           <a:p>
             <a:pPr algn="ctr"/>
             <a:r>
-              <a:rPr lang="en-US" dirty="0" smtClean="0">
+              <a:rPr lang="en-US" dirty="0">
                 <a:solidFill>
                   <a:srgbClr val="092529"/>
                 </a:solidFill>
@@ -13391,14 +13566,6 @@
               </a:rPr>
               <a:t>What if we want to do the same set of instructions again?</a:t>
             </a:r>
-            <a:endParaRPr lang="en-US" dirty="0">
-              <a:solidFill>
-                <a:srgbClr val="092529"/>
-              </a:solidFill>
-              <a:latin typeface="Proxima Nova" charset="0"/>
-              <a:ea typeface="Proxima Nova" charset="0"/>
-              <a:cs typeface="Proxima Nova" charset="0"/>
-            </a:endParaRPr>
           </a:p>
         </p:txBody>
       </p:sp>
@@ -13453,7 +13620,7 @@
           <a:p>
             <a:pPr algn="ctr"/>
             <a:r>
-              <a:rPr lang="en-US" dirty="0" smtClean="0">
+              <a:rPr lang="en-US" dirty="0">
                 <a:solidFill>
                   <a:srgbClr val="092529"/>
                 </a:solidFill>
@@ -13463,14 +13630,6 @@
               </a:rPr>
               <a:t>REUSE CODE</a:t>
             </a:r>
-            <a:endParaRPr lang="en-US" dirty="0">
-              <a:solidFill>
-                <a:srgbClr val="092529"/>
-              </a:solidFill>
-              <a:latin typeface="Proxima Nova" charset="0"/>
-              <a:ea typeface="Proxima Nova" charset="0"/>
-              <a:cs typeface="Proxima Nova" charset="0"/>
-            </a:endParaRPr>
           </a:p>
         </p:txBody>
       </p:sp>
@@ -13747,18 +13906,9 @@
           <a:p>
             <a:pPr fontAlgn="base"/>
             <a:r>
-              <a:rPr lang="en-US" dirty="0" smtClean="0"/>
-              <a:t>The </a:t>
-            </a:r>
-            <a:r>
               <a:rPr lang="en-US" dirty="0"/>
-              <a:t>ENIAC women pioneered reusable </a:t>
-            </a:r>
-            <a:r>
-              <a:rPr lang="en-US" dirty="0" smtClean="0"/>
-              <a:t>code</a:t>
-            </a:r>
-            <a:endParaRPr lang="en-US" dirty="0"/>
+              <a:t>The ENIAC women pioneered reusable code</a:t>
+            </a:r>
           </a:p>
         </p:txBody>
       </p:sp>
@@ -14088,21 +14238,21 @@
               <a:buNone/>
             </a:pPr>
             <a:r>
-              <a:rPr lang="en-US" sz="1400" dirty="0" smtClean="0">
+              <a:rPr lang="en-US" sz="1400" dirty="0">
                 <a:latin typeface="Courier New" panose="02070309020205020404" pitchFamily="49" charset="0"/>
                 <a:cs typeface="Courier New" panose="02070309020205020404" pitchFamily="49" charset="0"/>
               </a:rPr>
               <a:t>public class </a:t>
             </a:r>
             <a:r>
-              <a:rPr lang="en-US" sz="1400" dirty="0" err="1" smtClean="0">
+              <a:rPr lang="en-US" sz="1400" dirty="0" err="1">
                 <a:latin typeface="Courier New" panose="02070309020205020404" pitchFamily="49" charset="0"/>
                 <a:cs typeface="Courier New" panose="02070309020205020404" pitchFamily="49" charset="0"/>
               </a:rPr>
               <a:t>BasicCalculations</a:t>
             </a:r>
             <a:r>
-              <a:rPr lang="en-US" sz="1400" dirty="0" smtClean="0">
+              <a:rPr lang="en-US" sz="1400" dirty="0">
                 <a:latin typeface="Courier New" panose="02070309020205020404" pitchFamily="49" charset="0"/>
                 <a:cs typeface="Courier New" panose="02070309020205020404" pitchFamily="49" charset="0"/>
               </a:rPr>
@@ -14124,21 +14274,21 @@
               <a:buNone/>
             </a:pPr>
             <a:r>
-              <a:rPr lang="en-US" sz="1400" dirty="0" smtClean="0">
+              <a:rPr lang="en-US" sz="1400" dirty="0">
                 <a:latin typeface="Courier New" panose="02070309020205020404" pitchFamily="49" charset="0"/>
                 <a:cs typeface="Courier New" panose="02070309020205020404" pitchFamily="49" charset="0"/>
               </a:rPr>
               <a:t>   public static void main(String[] </a:t>
             </a:r>
             <a:r>
-              <a:rPr lang="en-US" sz="1400" dirty="0" err="1" smtClean="0">
+              <a:rPr lang="en-US" sz="1400" dirty="0" err="1">
                 <a:latin typeface="Courier New" panose="02070309020205020404" pitchFamily="49" charset="0"/>
                 <a:cs typeface="Courier New" panose="02070309020205020404" pitchFamily="49" charset="0"/>
               </a:rPr>
               <a:t>args</a:t>
             </a:r>
             <a:r>
-              <a:rPr lang="en-US" sz="1400" dirty="0" smtClean="0">
+              <a:rPr lang="en-US" sz="1400" dirty="0">
                 <a:latin typeface="Courier New" panose="02070309020205020404" pitchFamily="49" charset="0"/>
                 <a:cs typeface="Courier New" panose="02070309020205020404" pitchFamily="49" charset="0"/>
               </a:rPr>
@@ -14160,7 +14310,7 @@
               <a:buNone/>
             </a:pPr>
             <a:r>
-              <a:rPr lang="en-US" sz="1400" dirty="0" smtClean="0">
+              <a:rPr lang="en-US" sz="1400" dirty="0">
                 <a:latin typeface="Courier New" panose="02070309020205020404" pitchFamily="49" charset="0"/>
                 <a:cs typeface="Courier New" panose="02070309020205020404" pitchFamily="49" charset="0"/>
               </a:rPr>
@@ -14182,7 +14332,7 @@
               <a:buNone/>
             </a:pPr>
             <a:r>
-              <a:rPr lang="en-US" sz="1400" dirty="0" smtClean="0">
+              <a:rPr lang="en-US" sz="1400" dirty="0">
                 <a:latin typeface="Courier New" panose="02070309020205020404" pitchFamily="49" charset="0"/>
                 <a:cs typeface="Courier New" panose="02070309020205020404" pitchFamily="49" charset="0"/>
               </a:rPr>
@@ -14204,7 +14354,7 @@
               <a:buNone/>
             </a:pPr>
             <a:r>
-              <a:rPr lang="en-US" sz="1400" dirty="0" smtClean="0">
+              <a:rPr lang="en-US" sz="1400" dirty="0">
                 <a:latin typeface="Courier New" panose="02070309020205020404" pitchFamily="49" charset="0"/>
                 <a:cs typeface="Courier New" panose="02070309020205020404" pitchFamily="49" charset="0"/>
               </a:rPr>
@@ -14226,7 +14376,7 @@
               <a:buNone/>
             </a:pPr>
             <a:r>
-              <a:rPr lang="en-US" sz="1400" dirty="0" smtClean="0">
+              <a:rPr lang="en-US" sz="1400" dirty="0">
                 <a:latin typeface="Courier New" panose="02070309020205020404" pitchFamily="49" charset="0"/>
                 <a:cs typeface="Courier New" panose="02070309020205020404" pitchFamily="49" charset="0"/>
               </a:rPr>
@@ -14248,7 +14398,7 @@
               <a:buNone/>
             </a:pPr>
             <a:r>
-              <a:rPr lang="en-US" sz="1400" dirty="0" smtClean="0">
+              <a:rPr lang="en-US" sz="1400" dirty="0">
                 <a:latin typeface="Courier New" panose="02070309020205020404" pitchFamily="49" charset="0"/>
                 <a:cs typeface="Courier New" panose="02070309020205020404" pitchFamily="49" charset="0"/>
               </a:rPr>
@@ -14270,7 +14420,7 @@
               <a:buNone/>
             </a:pPr>
             <a:r>
-              <a:rPr lang="en-US" sz="1400" dirty="0" smtClean="0">
+              <a:rPr lang="en-US" sz="1400" dirty="0">
                 <a:latin typeface="Courier New" panose="02070309020205020404" pitchFamily="49" charset="0"/>
                 <a:cs typeface="Courier New" panose="02070309020205020404" pitchFamily="49" charset="0"/>
               </a:rPr>
@@ -14292,7 +14442,7 @@
               <a:buNone/>
             </a:pPr>
             <a:r>
-              <a:rPr lang="en-US" sz="1400" dirty="0" smtClean="0">
+              <a:rPr lang="en-US" sz="1400" dirty="0">
                 <a:latin typeface="Courier New" panose="02070309020205020404" pitchFamily="49" charset="0"/>
                 <a:cs typeface="Courier New" panose="02070309020205020404" pitchFamily="49" charset="0"/>
               </a:rPr>
@@ -14314,21 +14464,21 @@
               <a:buNone/>
             </a:pPr>
             <a:r>
-              <a:rPr lang="en-US" sz="1400" dirty="0" smtClean="0">
+              <a:rPr lang="en-US" sz="1400" dirty="0">
                 <a:latin typeface="Courier New" panose="02070309020205020404" pitchFamily="49" charset="0"/>
                 <a:cs typeface="Courier New" panose="02070309020205020404" pitchFamily="49" charset="0"/>
               </a:rPr>
               <a:t>      </a:t>
             </a:r>
             <a:r>
-              <a:rPr lang="en-US" sz="1400" dirty="0" err="1" smtClean="0">
+              <a:rPr lang="en-US" sz="1400" dirty="0" err="1">
                 <a:latin typeface="Courier New" panose="02070309020205020404" pitchFamily="49" charset="0"/>
                 <a:cs typeface="Courier New" panose="02070309020205020404" pitchFamily="49" charset="0"/>
               </a:rPr>
               <a:t>System.out.println</a:t>
             </a:r>
             <a:r>
-              <a:rPr lang="en-US" sz="1400" dirty="0" smtClean="0">
+              <a:rPr lang="en-US" sz="1400" dirty="0">
                 <a:latin typeface="Courier New" panose="02070309020205020404" pitchFamily="49" charset="0"/>
                 <a:cs typeface="Courier New" panose="02070309020205020404" pitchFamily="49" charset="0"/>
               </a:rPr>
@@ -14354,24 +14504,17 @@
                 <a:latin typeface="Courier New" panose="02070309020205020404" pitchFamily="49" charset="0"/>
                 <a:cs typeface="Courier New" panose="02070309020205020404" pitchFamily="49" charset="0"/>
               </a:rPr>
-              <a:t> </a:t>
-            </a:r>
-            <a:r>
-              <a:rPr lang="en-US" sz="1400" dirty="0" smtClean="0">
-                <a:latin typeface="Courier New" panose="02070309020205020404" pitchFamily="49" charset="0"/>
-                <a:cs typeface="Courier New" panose="02070309020205020404" pitchFamily="49" charset="0"/>
-              </a:rPr>
-              <a:t>     </a:t>
-            </a:r>
-            <a:r>
-              <a:rPr lang="en-US" sz="1400" dirty="0" err="1" smtClean="0">
+              <a:t>      </a:t>
+            </a:r>
+            <a:r>
+              <a:rPr lang="en-US" sz="1400" dirty="0" err="1">
                 <a:latin typeface="Courier New" panose="02070309020205020404" pitchFamily="49" charset="0"/>
                 <a:cs typeface="Courier New" panose="02070309020205020404" pitchFamily="49" charset="0"/>
               </a:rPr>
               <a:t>System.out.println</a:t>
             </a:r>
             <a:r>
-              <a:rPr lang="en-US" sz="1400" dirty="0" smtClean="0">
+              <a:rPr lang="en-US" sz="1400" dirty="0">
                 <a:latin typeface="Courier New" panose="02070309020205020404" pitchFamily="49" charset="0"/>
                 <a:cs typeface="Courier New" panose="02070309020205020404" pitchFamily="49" charset="0"/>
               </a:rPr>
@@ -14397,24 +14540,17 @@
                 <a:latin typeface="Courier New" panose="02070309020205020404" pitchFamily="49" charset="0"/>
                 <a:cs typeface="Courier New" panose="02070309020205020404" pitchFamily="49" charset="0"/>
               </a:rPr>
-              <a:t> </a:t>
-            </a:r>
-            <a:r>
-              <a:rPr lang="en-US" sz="1400" dirty="0" smtClean="0">
-                <a:latin typeface="Courier New" panose="02070309020205020404" pitchFamily="49" charset="0"/>
-                <a:cs typeface="Courier New" panose="02070309020205020404" pitchFamily="49" charset="0"/>
-              </a:rPr>
-              <a:t>     </a:t>
-            </a:r>
-            <a:r>
-              <a:rPr lang="en-US" sz="1400" dirty="0" err="1" smtClean="0">
+              <a:t>      </a:t>
+            </a:r>
+            <a:r>
+              <a:rPr lang="en-US" sz="1400" dirty="0" err="1">
                 <a:latin typeface="Courier New" panose="02070309020205020404" pitchFamily="49" charset="0"/>
                 <a:cs typeface="Courier New" panose="02070309020205020404" pitchFamily="49" charset="0"/>
               </a:rPr>
               <a:t>System.out.println</a:t>
             </a:r>
             <a:r>
-              <a:rPr lang="en-US" sz="1400" dirty="0" smtClean="0">
+              <a:rPr lang="en-US" sz="1400" dirty="0">
                 <a:latin typeface="Courier New" panose="02070309020205020404" pitchFamily="49" charset="0"/>
                 <a:cs typeface="Courier New" panose="02070309020205020404" pitchFamily="49" charset="0"/>
               </a:rPr>
@@ -14440,24 +14576,17 @@
                 <a:latin typeface="Courier New" panose="02070309020205020404" pitchFamily="49" charset="0"/>
                 <a:cs typeface="Courier New" panose="02070309020205020404" pitchFamily="49" charset="0"/>
               </a:rPr>
-              <a:t> </a:t>
-            </a:r>
-            <a:r>
-              <a:rPr lang="en-US" sz="1400" dirty="0" smtClean="0">
-                <a:latin typeface="Courier New" panose="02070309020205020404" pitchFamily="49" charset="0"/>
-                <a:cs typeface="Courier New" panose="02070309020205020404" pitchFamily="49" charset="0"/>
-              </a:rPr>
-              <a:t>     </a:t>
-            </a:r>
-            <a:r>
-              <a:rPr lang="en-US" sz="1400" dirty="0" err="1" smtClean="0">
+              <a:t>      </a:t>
+            </a:r>
+            <a:r>
+              <a:rPr lang="en-US" sz="1400" dirty="0" err="1">
                 <a:latin typeface="Courier New" panose="02070309020205020404" pitchFamily="49" charset="0"/>
                 <a:cs typeface="Courier New" panose="02070309020205020404" pitchFamily="49" charset="0"/>
               </a:rPr>
               <a:t>System.out.println</a:t>
             </a:r>
             <a:r>
-              <a:rPr lang="en-US" sz="1400" dirty="0" smtClean="0">
+              <a:rPr lang="en-US" sz="1400" dirty="0">
                 <a:latin typeface="Courier New" panose="02070309020205020404" pitchFamily="49" charset="0"/>
                 <a:cs typeface="Courier New" panose="02070309020205020404" pitchFamily="49" charset="0"/>
               </a:rPr>
@@ -14479,7 +14608,7 @@
               <a:buNone/>
             </a:pPr>
             <a:r>
-              <a:rPr lang="en-US" sz="1400" dirty="0" smtClean="0">
+              <a:rPr lang="en-US" sz="1400" dirty="0">
                 <a:latin typeface="Courier New" panose="02070309020205020404" pitchFamily="49" charset="0"/>
                 <a:cs typeface="Courier New" panose="02070309020205020404" pitchFamily="49" charset="0"/>
               </a:rPr>
@@ -14501,7 +14630,7 @@
               <a:buNone/>
             </a:pPr>
             <a:r>
-              <a:rPr lang="en-US" sz="1400" dirty="0" smtClean="0">
+              <a:rPr lang="en-US" sz="1400" dirty="0">
                 <a:latin typeface="Courier New" panose="02070309020205020404" pitchFamily="49" charset="0"/>
                 <a:cs typeface="Courier New" panose="02070309020205020404" pitchFamily="49" charset="0"/>
               </a:rPr>
@@ -14523,7 +14652,7 @@
               <a:buNone/>
             </a:pPr>
             <a:r>
-              <a:rPr lang="en-US" sz="1400" dirty="0" smtClean="0">
+              <a:rPr lang="en-US" sz="1400" dirty="0">
                 <a:latin typeface="Courier New" panose="02070309020205020404" pitchFamily="49" charset="0"/>
                 <a:cs typeface="Courier New" panose="02070309020205020404" pitchFamily="49" charset="0"/>
               </a:rPr>
@@ -14545,7 +14674,7 @@
               <a:buNone/>
             </a:pPr>
             <a:r>
-              <a:rPr lang="en-US" sz="1400" dirty="0" smtClean="0">
+              <a:rPr lang="en-US" sz="1400" dirty="0">
                 <a:latin typeface="Courier New" panose="02070309020205020404" pitchFamily="49" charset="0"/>
                 <a:cs typeface="Courier New" panose="02070309020205020404" pitchFamily="49" charset="0"/>
               </a:rPr>
@@ -14567,7 +14696,7 @@
               <a:buNone/>
             </a:pPr>
             <a:r>
-              <a:rPr lang="en-US" sz="1400" dirty="0" smtClean="0">
+              <a:rPr lang="en-US" sz="1400" dirty="0">
                 <a:latin typeface="Courier New" panose="02070309020205020404" pitchFamily="49" charset="0"/>
                 <a:cs typeface="Courier New" panose="02070309020205020404" pitchFamily="49" charset="0"/>
               </a:rPr>
@@ -14589,7 +14718,7 @@
               <a:buNone/>
             </a:pPr>
             <a:r>
-              <a:rPr lang="en-US" sz="1400" dirty="0" smtClean="0">
+              <a:rPr lang="en-US" sz="1400" dirty="0">
                 <a:latin typeface="Courier New" panose="02070309020205020404" pitchFamily="49" charset="0"/>
                 <a:cs typeface="Courier New" panose="02070309020205020404" pitchFamily="49" charset="0"/>
               </a:rPr>
@@ -14611,21 +14740,21 @@
               <a:buNone/>
             </a:pPr>
             <a:r>
-              <a:rPr lang="en-US" sz="1400" dirty="0" smtClean="0">
+              <a:rPr lang="en-US" sz="1400" dirty="0">
                 <a:latin typeface="Courier New" panose="02070309020205020404" pitchFamily="49" charset="0"/>
                 <a:cs typeface="Courier New" panose="02070309020205020404" pitchFamily="49" charset="0"/>
               </a:rPr>
               <a:t>      </a:t>
             </a:r>
             <a:r>
-              <a:rPr lang="en-US" sz="1400" dirty="0" err="1" smtClean="0">
+              <a:rPr lang="en-US" sz="1400" dirty="0" err="1">
                 <a:latin typeface="Courier New" panose="02070309020205020404" pitchFamily="49" charset="0"/>
                 <a:cs typeface="Courier New" panose="02070309020205020404" pitchFamily="49" charset="0"/>
               </a:rPr>
               <a:t>System.out.println</a:t>
             </a:r>
             <a:r>
-              <a:rPr lang="en-US" sz="1400" dirty="0" smtClean="0">
+              <a:rPr lang="en-US" sz="1400" dirty="0">
                 <a:latin typeface="Courier New" panose="02070309020205020404" pitchFamily="49" charset="0"/>
                 <a:cs typeface="Courier New" panose="02070309020205020404" pitchFamily="49" charset="0"/>
               </a:rPr>
@@ -14647,21 +14776,21 @@
               <a:buNone/>
             </a:pPr>
             <a:r>
-              <a:rPr lang="en-US" sz="1400" dirty="0" smtClean="0">
+              <a:rPr lang="en-US" sz="1400" dirty="0">
                 <a:latin typeface="Courier New" panose="02070309020205020404" pitchFamily="49" charset="0"/>
                 <a:cs typeface="Courier New" panose="02070309020205020404" pitchFamily="49" charset="0"/>
               </a:rPr>
               <a:t>      </a:t>
             </a:r>
             <a:r>
-              <a:rPr lang="en-US" sz="1400" dirty="0" err="1" smtClean="0">
+              <a:rPr lang="en-US" sz="1400" dirty="0" err="1">
                 <a:latin typeface="Courier New" panose="02070309020205020404" pitchFamily="49" charset="0"/>
                 <a:cs typeface="Courier New" panose="02070309020205020404" pitchFamily="49" charset="0"/>
               </a:rPr>
               <a:t>System.out.println</a:t>
             </a:r>
             <a:r>
-              <a:rPr lang="en-US" sz="1400" dirty="0" smtClean="0">
+              <a:rPr lang="en-US" sz="1400" dirty="0">
                 <a:latin typeface="Courier New" panose="02070309020205020404" pitchFamily="49" charset="0"/>
                 <a:cs typeface="Courier New" panose="02070309020205020404" pitchFamily="49" charset="0"/>
               </a:rPr>
@@ -14683,21 +14812,21 @@
               <a:buNone/>
             </a:pPr>
             <a:r>
-              <a:rPr lang="en-US" sz="1400" dirty="0" smtClean="0">
+              <a:rPr lang="en-US" sz="1400" dirty="0">
                 <a:latin typeface="Courier New" panose="02070309020205020404" pitchFamily="49" charset="0"/>
                 <a:cs typeface="Courier New" panose="02070309020205020404" pitchFamily="49" charset="0"/>
               </a:rPr>
               <a:t>      </a:t>
             </a:r>
             <a:r>
-              <a:rPr lang="en-US" sz="1400" dirty="0" err="1" smtClean="0">
+              <a:rPr lang="en-US" sz="1400" dirty="0" err="1">
                 <a:latin typeface="Courier New" panose="02070309020205020404" pitchFamily="49" charset="0"/>
                 <a:cs typeface="Courier New" panose="02070309020205020404" pitchFamily="49" charset="0"/>
               </a:rPr>
               <a:t>System.out.println</a:t>
             </a:r>
             <a:r>
-              <a:rPr lang="en-US" sz="1400" dirty="0" smtClean="0">
+              <a:rPr lang="en-US" sz="1400" dirty="0">
                 <a:latin typeface="Courier New" panose="02070309020205020404" pitchFamily="49" charset="0"/>
                 <a:cs typeface="Courier New" panose="02070309020205020404" pitchFamily="49" charset="0"/>
               </a:rPr>
@@ -14719,21 +14848,21 @@
               <a:buNone/>
             </a:pPr>
             <a:r>
-              <a:rPr lang="en-US" sz="1400" dirty="0" smtClean="0">
+              <a:rPr lang="en-US" sz="1400" dirty="0">
                 <a:latin typeface="Courier New" panose="02070309020205020404" pitchFamily="49" charset="0"/>
                 <a:cs typeface="Courier New" panose="02070309020205020404" pitchFamily="49" charset="0"/>
               </a:rPr>
               <a:t>      </a:t>
             </a:r>
             <a:r>
-              <a:rPr lang="en-US" sz="1400" dirty="0" err="1" smtClean="0">
+              <a:rPr lang="en-US" sz="1400" dirty="0" err="1">
                 <a:latin typeface="Courier New" panose="02070309020205020404" pitchFamily="49" charset="0"/>
                 <a:cs typeface="Courier New" panose="02070309020205020404" pitchFamily="49" charset="0"/>
               </a:rPr>
               <a:t>System.out.println</a:t>
             </a:r>
             <a:r>
-              <a:rPr lang="en-US" sz="1400" dirty="0" smtClean="0">
+              <a:rPr lang="en-US" sz="1400" dirty="0">
                 <a:latin typeface="Courier New" panose="02070309020205020404" pitchFamily="49" charset="0"/>
                 <a:cs typeface="Courier New" panose="02070309020205020404" pitchFamily="49" charset="0"/>
               </a:rPr>
@@ -14755,7 +14884,7 @@
               <a:buNone/>
             </a:pPr>
             <a:r>
-              <a:rPr lang="en-US" sz="1400" dirty="0" smtClean="0">
+              <a:rPr lang="en-US" sz="1400" dirty="0">
                 <a:latin typeface="Courier New" panose="02070309020205020404" pitchFamily="49" charset="0"/>
                 <a:cs typeface="Courier New" panose="02070309020205020404" pitchFamily="49" charset="0"/>
               </a:rPr>
@@ -14777,16 +14906,12 @@
               <a:buNone/>
             </a:pPr>
             <a:r>
-              <a:rPr lang="en-US" sz="1400" dirty="0" smtClean="0">
+              <a:rPr lang="en-US" sz="1400" dirty="0">
                 <a:latin typeface="Courier New" panose="02070309020205020404" pitchFamily="49" charset="0"/>
                 <a:cs typeface="Courier New" panose="02070309020205020404" pitchFamily="49" charset="0"/>
               </a:rPr>
               <a:t>}</a:t>
             </a:r>
-            <a:endParaRPr lang="en-US" sz="1400" dirty="0">
-              <a:latin typeface="Courier New" panose="02070309020205020404" pitchFamily="49" charset="0"/>
-              <a:cs typeface="Courier New" panose="02070309020205020404" pitchFamily="49" charset="0"/>
-            </a:endParaRPr>
           </a:p>
         </p:txBody>
       </p:sp>
@@ -14838,7 +14963,7 @@
           <a:p>
             <a:pPr algn="ctr"/>
             <a:r>
-              <a:rPr lang="en-US" dirty="0" smtClean="0">
+              <a:rPr lang="en-US" dirty="0">
                 <a:solidFill>
                   <a:srgbClr val="092529"/>
                 </a:solidFill>
@@ -14848,14 +14973,6 @@
               </a:rPr>
               <a:t>Is this a good way to reuse code?</a:t>
             </a:r>
-            <a:endParaRPr lang="en-US" dirty="0">
-              <a:solidFill>
-                <a:srgbClr val="092529"/>
-              </a:solidFill>
-              <a:latin typeface="Proxima Nova" charset="0"/>
-              <a:ea typeface="Proxima Nova" charset="0"/>
-              <a:cs typeface="Proxima Nova" charset="0"/>
-            </a:endParaRPr>
           </a:p>
         </p:txBody>
       </p:sp>
@@ -14910,7 +15027,7 @@
           <a:p>
             <a:pPr algn="ctr" fontAlgn="base"/>
             <a:r>
-              <a:rPr lang="en-US" dirty="0" smtClean="0">
+              <a:rPr lang="en-US" dirty="0">
                 <a:solidFill>
                   <a:srgbClr val="092529"/>
                 </a:solidFill>
@@ -14920,14 +15037,6 @@
               </a:rPr>
               <a:t>Modularize code</a:t>
             </a:r>
-            <a:endParaRPr lang="en-US" dirty="0">
-              <a:solidFill>
-                <a:srgbClr val="092529"/>
-              </a:solidFill>
-              <a:latin typeface="Proxima Nova" charset="0"/>
-              <a:ea typeface="Proxima Nova" charset="0"/>
-              <a:cs typeface="Proxima Nova" charset="0"/>
-            </a:endParaRPr>
           </a:p>
         </p:txBody>
       </p:sp>
@@ -14982,7 +15091,7 @@
           <a:p>
             <a:pPr algn="ctr" fontAlgn="base"/>
             <a:r>
-              <a:rPr lang="en-US" dirty="0" smtClean="0">
+              <a:rPr lang="en-US" dirty="0">
                 <a:solidFill>
                   <a:srgbClr val="092529"/>
                 </a:solidFill>
@@ -14992,14 +15101,6 @@
               </a:rPr>
               <a:t>Object-Oriented Design</a:t>
             </a:r>
-            <a:endParaRPr lang="en-US" dirty="0">
-              <a:solidFill>
-                <a:srgbClr val="092529"/>
-              </a:solidFill>
-              <a:latin typeface="Proxima Nova" charset="0"/>
-              <a:ea typeface="Proxima Nova" charset="0"/>
-              <a:cs typeface="Proxima Nova" charset="0"/>
-            </a:endParaRPr>
           </a:p>
         </p:txBody>
       </p:sp>
@@ -15197,13 +15298,8 @@
           <a:p>
             <a:r>
               <a:rPr lang="en-US" dirty="0"/>
-              <a:t>Why </a:t>
-            </a:r>
-            <a:r>
-              <a:rPr lang="en-US" dirty="0" smtClean="0"/>
-              <a:t>Objects and Methods?</a:t>
-            </a:r>
-            <a:endParaRPr lang="en-US" dirty="0"/>
+              <a:t>Why Objects and Methods?</a:t>
+            </a:r>
           </a:p>
         </p:txBody>
       </p:sp>
@@ -15229,13 +15325,6 @@
       </p:transition>
     </mc:Fallback>
   </mc:AlternateContent>
-  <p:timing>
-    <p:tnLst>
-      <p:par>
-        <p:cTn id="1" dur="indefinite" restart="never" nodeType="tmRoot"/>
-      </p:par>
-    </p:tnLst>
-  </p:timing>
 </p:sld>
 </file>
 
@@ -15308,7 +15397,7 @@
         <p:spPr>
           <a:xfrm>
             <a:off x="628073" y="1520872"/>
-            <a:ext cx="7910138" cy="5668283"/>
+            <a:ext cx="7910138" cy="5668218"/>
           </a:xfrm>
         </p:spPr>
         <p:txBody>
@@ -15401,6 +15490,13 @@
             <a:pPr lvl="1" fontAlgn="base"/>
             <a:r>
               <a:rPr lang="en-US" dirty="0"/>
+              <a:t>Objects are blocks of information, with reusable code / methods</a:t>
+            </a:r>
+          </a:p>
+          <a:p>
+            <a:pPr lvl="1" fontAlgn="base"/>
+            <a:r>
+              <a:rPr lang="en-US" dirty="0"/>
               <a:t>Methods are blocks of reusable code</a:t>
             </a:r>
           </a:p>
@@ -15409,13 +15505,6 @@
             <a:r>
               <a:rPr lang="en-US" dirty="0"/>
               <a:t>Ideally,  no more than 20 instructions</a:t>
-            </a:r>
-          </a:p>
-          <a:p>
-            <a:pPr lvl="1" fontAlgn="base"/>
-            <a:r>
-              <a:rPr lang="en-US" dirty="0"/>
-              <a:t>Objects are blocks of information, with reusable code / methods</a:t>
             </a:r>
           </a:p>
           <a:p>
@@ -15452,7 +15541,7 @@
         </p:nvSpPr>
         <p:spPr>
           <a:xfrm>
-            <a:off x="9440470" y="3886200"/>
+            <a:off x="9479659" y="3032104"/>
             <a:ext cx="2387450" cy="854096"/>
           </a:xfrm>
           <a:prstGeom prst="rect">
@@ -15513,7 +15602,7 @@
         </p:nvSpPr>
         <p:spPr>
           <a:xfrm>
-            <a:off x="7644523" y="4858646"/>
+            <a:off x="7683712" y="4004550"/>
             <a:ext cx="1931670" cy="731520"/>
           </a:xfrm>
           <a:prstGeom prst="rect">
@@ -15574,7 +15663,7 @@
         </p:nvSpPr>
         <p:spPr>
           <a:xfrm>
-            <a:off x="9668360" y="4858646"/>
+            <a:off x="9707549" y="4004550"/>
             <a:ext cx="1931670" cy="731520"/>
           </a:xfrm>
           <a:prstGeom prst="rect">
@@ -15635,7 +15724,7 @@
         </p:nvSpPr>
         <p:spPr>
           <a:xfrm>
-            <a:off x="11692197" y="4858646"/>
+            <a:off x="11731386" y="4004550"/>
             <a:ext cx="1931670" cy="731520"/>
           </a:xfrm>
           <a:prstGeom prst="rect">
@@ -15696,7 +15785,7 @@
         </p:nvSpPr>
         <p:spPr>
           <a:xfrm>
-            <a:off x="9440469" y="5668436"/>
+            <a:off x="9479658" y="4814340"/>
             <a:ext cx="2387449" cy="817822"/>
           </a:xfrm>
           <a:prstGeom prst="rect">
@@ -15849,17 +15938,471 @@
       </p:transition>
     </mc:Fallback>
   </mc:AlternateContent>
-  <p:timing>
-    <p:tnLst>
-      <p:par>
-        <p:cTn id="1" dur="indefinite" restart="never" nodeType="tmRoot"/>
-      </p:par>
-    </p:tnLst>
-  </p:timing>
 </p:sld>
 </file>
 
 <file path=ppt/slides/slide7.xml><?xml version="1.0" encoding="utf-8"?>
+<p:sld xmlns:a="http://schemas.openxmlformats.org/drawingml/2006/main" xmlns:r="http://schemas.openxmlformats.org/officeDocument/2006/relationships" xmlns:p="http://schemas.openxmlformats.org/presentationml/2006/main">
+  <p:cSld>
+    <p:spTree>
+      <p:nvGrpSpPr>
+        <p:cNvPr id="1" name=""/>
+        <p:cNvGrpSpPr/>
+        <p:nvPr/>
+      </p:nvGrpSpPr>
+      <p:grpSpPr>
+        <a:xfrm>
+          <a:off x="0" y="0"/>
+          <a:ext cx="0" cy="0"/>
+          <a:chOff x="0" y="0"/>
+          <a:chExt cx="0" cy="0"/>
+        </a:xfrm>
+      </p:grpSpPr>
+      <p:sp>
+        <p:nvSpPr>
+          <p:cNvPr id="2" name="Title 1">
+            <a:extLst>
+              <a:ext uri="{FF2B5EF4-FFF2-40B4-BE49-F238E27FC236}">
+                <a16:creationId xmlns:a16="http://schemas.microsoft.com/office/drawing/2014/main" id="{0AC91572-99FC-2C40-9123-5231EE43E34F}"/>
+              </a:ext>
+            </a:extLst>
+          </p:cNvPr>
+          <p:cNvSpPr>
+            <a:spLocks noGrp="1"/>
+          </p:cNvSpPr>
+          <p:nvPr>
+            <p:ph type="title"/>
+          </p:nvPr>
+        </p:nvSpPr>
+        <p:spPr>
+          <a:xfrm>
+            <a:off x="628072" y="656904"/>
+            <a:ext cx="12561453" cy="1015663"/>
+          </a:xfrm>
+        </p:spPr>
+        <p:txBody>
+          <a:bodyPr/>
+          <a:lstStyle/>
+          <a:p>
+            <a:r>
+              <a:rPr lang="en-US" dirty="0"/>
+              <a:t>Objects are Building Blocks</a:t>
+            </a:r>
+          </a:p>
+        </p:txBody>
+      </p:sp>
+      <p:sp>
+        <p:nvSpPr>
+          <p:cNvPr id="3" name="Text Placeholder 2">
+            <a:extLst>
+              <a:ext uri="{FF2B5EF4-FFF2-40B4-BE49-F238E27FC236}">
+                <a16:creationId xmlns:a16="http://schemas.microsoft.com/office/drawing/2014/main" id="{A4FEB9CE-D22E-304F-98BA-26309D98AD8F}"/>
+              </a:ext>
+            </a:extLst>
+          </p:cNvPr>
+          <p:cNvSpPr>
+            <a:spLocks noGrp="1"/>
+          </p:cNvSpPr>
+          <p:nvPr>
+            <p:ph type="body" sz="quarter" idx="10"/>
+          </p:nvPr>
+        </p:nvSpPr>
+        <p:spPr>
+          <a:xfrm>
+            <a:off x="628072" y="1800240"/>
+            <a:ext cx="12561453" cy="5905591"/>
+          </a:xfrm>
+        </p:spPr>
+        <p:txBody>
+          <a:bodyPr/>
+          <a:lstStyle/>
+          <a:p>
+            <a:pPr fontAlgn="base"/>
+            <a:r>
+              <a:rPr lang="en-US" dirty="0"/>
+              <a:t>Think of LEGOs </a:t>
+            </a:r>
+          </a:p>
+          <a:p>
+            <a:pPr lvl="1" fontAlgn="base"/>
+            <a:r>
+              <a:rPr lang="en-US" dirty="0"/>
+              <a:t>Blocks </a:t>
+            </a:r>
+          </a:p>
+          <a:p>
+            <a:pPr lvl="1" fontAlgn="base"/>
+            <a:r>
+              <a:rPr lang="en-US" dirty="0"/>
+              <a:t>Assembled in different ways - creates new and interesting things</a:t>
+            </a:r>
+          </a:p>
+          <a:p>
+            <a:pPr fontAlgn="base"/>
+            <a:r>
+              <a:rPr lang="en-US" dirty="0"/>
+              <a:t>Objects contain information in a logical order </a:t>
+            </a:r>
+          </a:p>
+          <a:p>
+            <a:pPr fontAlgn="base"/>
+            <a:r>
+              <a:rPr lang="en-US" dirty="0"/>
+              <a:t>Example: </a:t>
+            </a:r>
+            <a:r>
+              <a:rPr lang="en-US" u="sng" dirty="0"/>
+              <a:t>Strings are objects</a:t>
+            </a:r>
+          </a:p>
+          <a:p>
+            <a:pPr lvl="1"/>
+            <a:r>
+              <a:rPr lang="en-US" dirty="0">
+                <a:latin typeface="Consolas" panose="020B0609020204030204" pitchFamily="49" charset="0"/>
+                <a:cs typeface="Consolas" panose="020B0609020204030204" pitchFamily="49" charset="0"/>
+              </a:rPr>
+              <a:t>String companion = “Clara”; // note, Strings are so common, they have this shortcut</a:t>
+            </a:r>
+          </a:p>
+          <a:p>
+            <a:pPr lvl="1"/>
+            <a:r>
+              <a:rPr lang="en-US" dirty="0" err="1">
+                <a:latin typeface="Consolas" panose="020B0609020204030204" pitchFamily="49" charset="0"/>
+                <a:cs typeface="Consolas" panose="020B0609020204030204" pitchFamily="49" charset="0"/>
+              </a:rPr>
+              <a:t>companion.length</a:t>
+            </a:r>
+            <a:r>
+              <a:rPr lang="en-US" dirty="0">
+                <a:latin typeface="Consolas" panose="020B0609020204030204" pitchFamily="49" charset="0"/>
+                <a:cs typeface="Consolas" panose="020B0609020204030204" pitchFamily="49" charset="0"/>
+              </a:rPr>
+              <a:t>(); // returns 5</a:t>
+            </a:r>
+          </a:p>
+          <a:p>
+            <a:pPr fontAlgn="base"/>
+            <a:r>
+              <a:rPr lang="en-US" dirty="0"/>
+              <a:t>Most objects use the </a:t>
+            </a:r>
+            <a:r>
+              <a:rPr lang="en-US" b="1" dirty="0"/>
+              <a:t>new</a:t>
+            </a:r>
+            <a:r>
+              <a:rPr lang="en-US" dirty="0"/>
+              <a:t> keyword</a:t>
+            </a:r>
+          </a:p>
+          <a:p>
+            <a:pPr lvl="1"/>
+            <a:r>
+              <a:rPr lang="en-US" dirty="0" err="1">
+                <a:latin typeface="Consolas" panose="020B0609020204030204" pitchFamily="49" charset="0"/>
+                <a:cs typeface="Consolas" panose="020B0609020204030204" pitchFamily="49" charset="0"/>
+              </a:rPr>
+              <a:t>MyCoolObject</a:t>
+            </a:r>
+            <a:r>
+              <a:rPr lang="en-US" dirty="0">
+                <a:latin typeface="Consolas" panose="020B0609020204030204" pitchFamily="49" charset="0"/>
+                <a:cs typeface="Consolas" panose="020B0609020204030204" pitchFamily="49" charset="0"/>
+              </a:rPr>
+              <a:t> obj = new </a:t>
+            </a:r>
+            <a:r>
+              <a:rPr lang="en-US" dirty="0" err="1">
+                <a:latin typeface="Consolas" panose="020B0609020204030204" pitchFamily="49" charset="0"/>
+                <a:cs typeface="Consolas" panose="020B0609020204030204" pitchFamily="49" charset="0"/>
+              </a:rPr>
+              <a:t>MyCoolObject</a:t>
+            </a:r>
+            <a:r>
+              <a:rPr lang="en-US" dirty="0">
+                <a:latin typeface="Consolas" panose="020B0609020204030204" pitchFamily="49" charset="0"/>
+                <a:cs typeface="Consolas" panose="020B0609020204030204" pitchFamily="49" charset="0"/>
+              </a:rPr>
+              <a:t>(); // this reserves room in memory</a:t>
+            </a:r>
+          </a:p>
+          <a:p>
+            <a:pPr lvl="1"/>
+            <a:r>
+              <a:rPr lang="en-US" dirty="0" err="1">
+                <a:latin typeface="Consolas" panose="020B0609020204030204" pitchFamily="49" charset="0"/>
+                <a:cs typeface="Consolas" panose="020B0609020204030204" pitchFamily="49" charset="0"/>
+              </a:rPr>
+              <a:t>obj.myCoolMethod</a:t>
+            </a:r>
+            <a:r>
+              <a:rPr lang="en-US" dirty="0">
+                <a:latin typeface="Consolas" panose="020B0609020204030204" pitchFamily="49" charset="0"/>
+                <a:cs typeface="Consolas" panose="020B0609020204030204" pitchFamily="49" charset="0"/>
+              </a:rPr>
+              <a:t>();</a:t>
+            </a:r>
+          </a:p>
+          <a:p>
+            <a:pPr fontAlgn="base"/>
+            <a:r>
+              <a:rPr lang="en-US" dirty="0"/>
+              <a:t>We will keep coming back to this</a:t>
+            </a:r>
+          </a:p>
+          <a:p>
+            <a:pPr lvl="1" fontAlgn="base"/>
+            <a:r>
+              <a:rPr lang="en-US" dirty="0"/>
+              <a:t>Important to know - </a:t>
+            </a:r>
+            <a:r>
+              <a:rPr lang="en-US" u="sng" dirty="0"/>
+              <a:t>methods belong to Objects</a:t>
+            </a:r>
+          </a:p>
+          <a:p>
+            <a:pPr lvl="1" fontAlgn="base"/>
+            <a:r>
+              <a:rPr lang="en-US" dirty="0"/>
+              <a:t>Even methods that </a:t>
+            </a:r>
+            <a:r>
+              <a:rPr lang="en-US" b="1" dirty="0"/>
+              <a:t>you</a:t>
+            </a:r>
+            <a:r>
+              <a:rPr lang="en-US" dirty="0"/>
+              <a:t> write</a:t>
+            </a:r>
+          </a:p>
+          <a:p>
+            <a:endParaRPr lang="en-US" dirty="0"/>
+          </a:p>
+        </p:txBody>
+      </p:sp>
+      <p:sp>
+        <p:nvSpPr>
+          <p:cNvPr id="5" name="Rectangle 3">
+            <a:extLst>
+              <a:ext uri="{FF2B5EF4-FFF2-40B4-BE49-F238E27FC236}">
+                <a16:creationId xmlns:a16="http://schemas.microsoft.com/office/drawing/2014/main" id="{1B52B995-A490-EF4B-81C8-8848A14EA2C6}"/>
+              </a:ext>
+            </a:extLst>
+          </p:cNvPr>
+          <p:cNvSpPr>
+            <a:spLocks noChangeArrowheads="1"/>
+          </p:cNvSpPr>
+          <p:nvPr/>
+        </p:nvSpPr>
+        <p:spPr bwMode="auto">
+          <a:xfrm>
+            <a:off x="10398100" y="2365663"/>
+            <a:ext cx="3328155" cy="184666"/>
+          </a:xfrm>
+          <a:prstGeom prst="rect">
+            <a:avLst/>
+          </a:prstGeom>
+          <a:noFill/>
+          <a:ln>
+            <a:noFill/>
+          </a:ln>
+          <a:effectLst/>
+          <a:extLst>
+            <a:ext uri="{909E8E84-426E-40DD-AFC4-6F175D3DCCD1}">
+              <a14:hiddenFill xmlns:a14="http://schemas.microsoft.com/office/drawing/2010/main">
+                <a:solidFill>
+                  <a:schemeClr val="accent1"/>
+                </a:solidFill>
+              </a14:hiddenFill>
+            </a:ext>
+            <a:ext uri="{91240B29-F687-4F45-9708-019B960494DF}">
+              <a14:hiddenLine xmlns:a14="http://schemas.microsoft.com/office/drawing/2010/main" w="9525">
+                <a:solidFill>
+                  <a:schemeClr val="tx1"/>
+                </a:solidFill>
+                <a:miter lim="800000"/>
+                <a:headEnd/>
+                <a:tailEnd/>
+              </a14:hiddenLine>
+            </a:ext>
+            <a:ext uri="{AF507438-7753-43E0-B8FC-AC1667EBCBE1}">
+              <a14:hiddenEffects xmlns:a14="http://schemas.microsoft.com/office/drawing/2010/main">
+                <a:effectLst>
+                  <a:outerShdw dist="35921" dir="2700000" algn="ctr" rotWithShape="0">
+                    <a:schemeClr val="bg2"/>
+                  </a:outerShdw>
+                </a:effectLst>
+              </a14:hiddenEffects>
+            </a:ext>
+          </a:extLst>
+        </p:spPr>
+        <p:txBody>
+          <a:bodyPr vert="horz" wrap="none" lIns="91440" tIns="45720" rIns="91440" bIns="45720" numCol="1" anchor="ctr" anchorCtr="0" compatLnSpc="1">
+            <a:prstTxWarp prst="textNoShape">
+              <a:avLst/>
+            </a:prstTxWarp>
+            <a:spAutoFit/>
+          </a:bodyPr>
+          <a:lstStyle/>
+          <a:p>
+            <a:pPr marL="0" marR="0" lvl="0" indent="0" algn="l" defTabSz="914400" rtl="0" eaLnBrk="0" fontAlgn="base" latinLnBrk="0" hangingPunct="0">
+              <a:lnSpc>
+                <a:spcPct val="100000"/>
+              </a:lnSpc>
+              <a:spcBef>
+                <a:spcPct val="0"/>
+              </a:spcBef>
+              <a:spcAft>
+                <a:spcPct val="0"/>
+              </a:spcAft>
+              <a:buClrTx/>
+              <a:buSzTx/>
+              <a:buFontTx/>
+              <a:buNone/>
+              <a:tabLst/>
+            </a:pPr>
+            <a:r>
+              <a:rPr kumimoji="0" lang="en-US" altLang="en-US" sz="600" b="0" i="0" u="sng" strike="noStrike" cap="none" normalizeH="0" baseline="0" dirty="0">
+                <a:ln>
+                  <a:noFill/>
+                </a:ln>
+                <a:solidFill>
+                  <a:srgbClr val="3246A4"/>
+                </a:solidFill>
+                <a:effectLst/>
+                <a:latin typeface="Proxima Nova"/>
+                <a:hlinkClick r:id="rId2"/>
+              </a:rPr>
+              <a:t>© Ralf Roletschek</a:t>
+            </a:r>
+            <a:r>
+              <a:rPr kumimoji="0" lang="en-US" altLang="en-US" sz="600" b="0" i="0" u="none" strike="noStrike" cap="none" normalizeH="0" baseline="0" dirty="0">
+                <a:ln>
+                  <a:noFill/>
+                </a:ln>
+                <a:solidFill>
+                  <a:srgbClr val="000000"/>
+                </a:solidFill>
+                <a:effectLst/>
+                <a:latin typeface="Proxima Nova"/>
+              </a:rPr>
+              <a:t> - Published with permission. Read full copy information on </a:t>
+            </a:r>
+            <a:r>
+              <a:rPr kumimoji="0" lang="en-US" altLang="en-US" sz="600" b="0" i="0" u="sng" strike="noStrike" cap="none" normalizeH="0" baseline="0" dirty="0">
+                <a:ln>
+                  <a:noFill/>
+                </a:ln>
+                <a:solidFill>
+                  <a:srgbClr val="3246A4"/>
+                </a:solidFill>
+                <a:effectLst/>
+                <a:latin typeface="Proxima Nova"/>
+                <a:hlinkClick r:id="rId3"/>
+              </a:rPr>
+              <a:t>wikicommons</a:t>
+            </a:r>
+            <a:r>
+              <a:rPr kumimoji="0" lang="en-US" altLang="en-US" sz="600" b="0" i="0" u="none" strike="noStrike" cap="none" normalizeH="0" baseline="0" dirty="0">
+                <a:ln>
+                  <a:noFill/>
+                </a:ln>
+                <a:solidFill>
+                  <a:srgbClr val="000000"/>
+                </a:solidFill>
+                <a:effectLst/>
+                <a:latin typeface="Proxima Nova"/>
+              </a:rPr>
+              <a:t>. </a:t>
+            </a:r>
+            <a:endParaRPr kumimoji="0" lang="en-US" altLang="en-US" sz="1000" b="0" i="0" u="none" strike="noStrike" cap="none" normalizeH="0" baseline="0" dirty="0">
+              <a:ln>
+                <a:noFill/>
+              </a:ln>
+              <a:solidFill>
+                <a:schemeClr val="tx1"/>
+              </a:solidFill>
+              <a:effectLst/>
+            </a:endParaRPr>
+          </a:p>
+        </p:txBody>
+      </p:sp>
+      <p:pic>
+        <p:nvPicPr>
+          <p:cNvPr id="2052" name="Picture 4">
+            <a:extLst>
+              <a:ext uri="{FF2B5EF4-FFF2-40B4-BE49-F238E27FC236}">
+                <a16:creationId xmlns:a16="http://schemas.microsoft.com/office/drawing/2014/main" id="{D16D9799-4DC8-2C49-A07F-263769ED541E}"/>
+              </a:ext>
+            </a:extLst>
+          </p:cNvPr>
+          <p:cNvPicPr>
+            <a:picLocks noChangeAspect="1" noChangeArrowheads="1"/>
+          </p:cNvPicPr>
+          <p:nvPr/>
+        </p:nvPicPr>
+        <p:blipFill>
+          <a:blip r:embed="rId4">
+            <a:extLst>
+              <a:ext uri="{28A0092B-C50C-407E-A947-70E740481C1C}">
+                <a14:useLocalDpi xmlns:a14="http://schemas.microsoft.com/office/drawing/2010/main" val="0"/>
+              </a:ext>
+            </a:extLst>
+          </a:blip>
+          <a:srcRect/>
+          <a:stretch>
+            <a:fillRect/>
+          </a:stretch>
+        </p:blipFill>
+        <p:spPr bwMode="auto">
+          <a:xfrm>
+            <a:off x="10306756" y="0"/>
+            <a:ext cx="3510844" cy="2330323"/>
+          </a:xfrm>
+          <a:prstGeom prst="rect">
+            <a:avLst/>
+          </a:prstGeom>
+          <a:noFill/>
+          <a:extLst>
+            <a:ext uri="{909E8E84-426E-40DD-AFC4-6F175D3DCCD1}">
+              <a14:hiddenFill xmlns:a14="http://schemas.microsoft.com/office/drawing/2010/main">
+                <a:solidFill>
+                  <a:srgbClr val="FFFFFF"/>
+                </a:solidFill>
+              </a14:hiddenFill>
+            </a:ext>
+          </a:extLst>
+        </p:spPr>
+      </p:pic>
+    </p:spTree>
+    <p:extLst>
+      <p:ext uri="{BB962C8B-B14F-4D97-AF65-F5344CB8AC3E}">
+        <p14:creationId xmlns:p14="http://schemas.microsoft.com/office/powerpoint/2010/main" val="991584921"/>
+      </p:ext>
+    </p:extLst>
+  </p:cSld>
+  <p:clrMapOvr>
+    <a:masterClrMapping/>
+  </p:clrMapOvr>
+  <mc:AlternateContent xmlns:mc="http://schemas.openxmlformats.org/markup-compatibility/2006" xmlns:p14="http://schemas.microsoft.com/office/powerpoint/2010/main">
+    <mc:Choice Requires="p14">
+      <p:transition p14:dur="300">
+        <p:fade/>
+      </p:transition>
+    </mc:Choice>
+    <mc:Fallback xmlns="">
+      <p:transition>
+        <p:fade/>
+      </p:transition>
+    </mc:Fallback>
+  </mc:AlternateContent>
+</p:sld>
+</file>
+
+<file path=ppt/slides/slide8.xml><?xml version="1.0" encoding="utf-8"?>
 <p:sld xmlns:a="http://schemas.openxmlformats.org/drawingml/2006/main" xmlns:r="http://schemas.openxmlformats.org/officeDocument/2006/relationships" xmlns:p="http://schemas.openxmlformats.org/presentationml/2006/main">
   <p:cSld>
     <p:spTree>
@@ -15903,10 +16446,9 @@
           <a:lstStyle/>
           <a:p>
             <a:r>
-              <a:rPr lang="en-US" dirty="0" smtClean="0"/>
+              <a:rPr lang="en-US" dirty="0"/>
               <a:t>Reusing code</a:t>
             </a:r>
-            <a:endParaRPr lang="en-US" dirty="0"/>
           </a:p>
         </p:txBody>
       </p:sp>
@@ -16113,21 +16655,21 @@
               <a:buNone/>
             </a:pPr>
             <a:r>
-              <a:rPr lang="en-US" sz="1400" dirty="0" smtClean="0">
+              <a:rPr lang="en-US" sz="1400" dirty="0">
                 <a:latin typeface="Courier New" panose="02070309020205020404" pitchFamily="49" charset="0"/>
                 <a:cs typeface="Courier New" panose="02070309020205020404" pitchFamily="49" charset="0"/>
               </a:rPr>
               <a:t>public class </a:t>
             </a:r>
             <a:r>
-              <a:rPr lang="en-US" sz="1400" dirty="0" err="1" smtClean="0">
+              <a:rPr lang="en-US" sz="1400" dirty="0" err="1">
                 <a:latin typeface="Courier New" panose="02070309020205020404" pitchFamily="49" charset="0"/>
                 <a:cs typeface="Courier New" panose="02070309020205020404" pitchFamily="49" charset="0"/>
               </a:rPr>
               <a:t>BasicCalculations</a:t>
             </a:r>
             <a:r>
-              <a:rPr lang="en-US" sz="1400" dirty="0" smtClean="0">
+              <a:rPr lang="en-US" sz="1400" dirty="0">
                 <a:latin typeface="Courier New" panose="02070309020205020404" pitchFamily="49" charset="0"/>
                 <a:cs typeface="Courier New" panose="02070309020205020404" pitchFamily="49" charset="0"/>
               </a:rPr>
@@ -16149,21 +16691,21 @@
               <a:buNone/>
             </a:pPr>
             <a:r>
-              <a:rPr lang="en-US" sz="1400" dirty="0" smtClean="0">
+              <a:rPr lang="en-US" sz="1400" dirty="0">
                 <a:latin typeface="Courier New" panose="02070309020205020404" pitchFamily="49" charset="0"/>
                 <a:cs typeface="Courier New" panose="02070309020205020404" pitchFamily="49" charset="0"/>
               </a:rPr>
               <a:t>   public static void main(String[] </a:t>
             </a:r>
             <a:r>
-              <a:rPr lang="en-US" sz="1400" dirty="0" err="1" smtClean="0">
+              <a:rPr lang="en-US" sz="1400" dirty="0" err="1">
                 <a:latin typeface="Courier New" panose="02070309020205020404" pitchFamily="49" charset="0"/>
                 <a:cs typeface="Courier New" panose="02070309020205020404" pitchFamily="49" charset="0"/>
               </a:rPr>
               <a:t>args</a:t>
             </a:r>
             <a:r>
-              <a:rPr lang="en-US" sz="1400" dirty="0" smtClean="0">
+              <a:rPr lang="en-US" sz="1400" dirty="0">
                 <a:latin typeface="Courier New" panose="02070309020205020404" pitchFamily="49" charset="0"/>
                 <a:cs typeface="Courier New" panose="02070309020205020404" pitchFamily="49" charset="0"/>
               </a:rPr>
@@ -16185,7 +16727,7 @@
               <a:buNone/>
             </a:pPr>
             <a:r>
-              <a:rPr lang="en-US" sz="1400" dirty="0" smtClean="0">
+              <a:rPr lang="en-US" sz="1400" dirty="0">
                 <a:latin typeface="Courier New" panose="02070309020205020404" pitchFamily="49" charset="0"/>
                 <a:cs typeface="Courier New" panose="02070309020205020404" pitchFamily="49" charset="0"/>
               </a:rPr>
@@ -16207,7 +16749,7 @@
               <a:buNone/>
             </a:pPr>
             <a:r>
-              <a:rPr lang="en-US" sz="1400" dirty="0" smtClean="0">
+              <a:rPr lang="en-US" sz="1400" dirty="0">
                 <a:latin typeface="Courier New" panose="02070309020205020404" pitchFamily="49" charset="0"/>
                 <a:cs typeface="Courier New" panose="02070309020205020404" pitchFamily="49" charset="0"/>
               </a:rPr>
@@ -16229,7 +16771,7 @@
               <a:buNone/>
             </a:pPr>
             <a:r>
-              <a:rPr lang="en-US" sz="1400" dirty="0" smtClean="0">
+              <a:rPr lang="en-US" sz="1400" dirty="0">
                 <a:latin typeface="Courier New" panose="02070309020205020404" pitchFamily="49" charset="0"/>
                 <a:cs typeface="Courier New" panose="02070309020205020404" pitchFamily="49" charset="0"/>
               </a:rPr>
@@ -16251,7 +16793,7 @@
               <a:buNone/>
             </a:pPr>
             <a:r>
-              <a:rPr lang="en-US" sz="1400" dirty="0" smtClean="0">
+              <a:rPr lang="en-US" sz="1400" dirty="0">
                 <a:latin typeface="Courier New" panose="02070309020205020404" pitchFamily="49" charset="0"/>
                 <a:cs typeface="Courier New" panose="02070309020205020404" pitchFamily="49" charset="0"/>
               </a:rPr>
@@ -16273,7 +16815,7 @@
               <a:buNone/>
             </a:pPr>
             <a:r>
-              <a:rPr lang="en-US" sz="1400" dirty="0" smtClean="0">
+              <a:rPr lang="en-US" sz="1400" dirty="0">
                 <a:latin typeface="Courier New" panose="02070309020205020404" pitchFamily="49" charset="0"/>
                 <a:cs typeface="Courier New" panose="02070309020205020404" pitchFamily="49" charset="0"/>
               </a:rPr>
@@ -16295,7 +16837,7 @@
               <a:buNone/>
             </a:pPr>
             <a:r>
-              <a:rPr lang="en-US" sz="1400" dirty="0" smtClean="0">
+              <a:rPr lang="en-US" sz="1400" dirty="0">
                 <a:latin typeface="Courier New" panose="02070309020205020404" pitchFamily="49" charset="0"/>
                 <a:cs typeface="Courier New" panose="02070309020205020404" pitchFamily="49" charset="0"/>
               </a:rPr>
@@ -16317,7 +16859,7 @@
               <a:buNone/>
             </a:pPr>
             <a:r>
-              <a:rPr lang="en-US" sz="1400" dirty="0" smtClean="0">
+              <a:rPr lang="en-US" sz="1400" dirty="0">
                 <a:latin typeface="Courier New" panose="02070309020205020404" pitchFamily="49" charset="0"/>
                 <a:cs typeface="Courier New" panose="02070309020205020404" pitchFamily="49" charset="0"/>
               </a:rPr>
@@ -16339,21 +16881,21 @@
               <a:buNone/>
             </a:pPr>
             <a:r>
-              <a:rPr lang="en-US" sz="1400" dirty="0" smtClean="0">
+              <a:rPr lang="en-US" sz="1400" dirty="0">
                 <a:latin typeface="Courier New" panose="02070309020205020404" pitchFamily="49" charset="0"/>
                 <a:cs typeface="Courier New" panose="02070309020205020404" pitchFamily="49" charset="0"/>
               </a:rPr>
               <a:t>      </a:t>
             </a:r>
             <a:r>
-              <a:rPr lang="en-US" sz="1400" dirty="0" err="1" smtClean="0">
+              <a:rPr lang="en-US" sz="1400" dirty="0" err="1">
                 <a:latin typeface="Courier New" panose="02070309020205020404" pitchFamily="49" charset="0"/>
                 <a:cs typeface="Courier New" panose="02070309020205020404" pitchFamily="49" charset="0"/>
               </a:rPr>
               <a:t>System.out.println</a:t>
             </a:r>
             <a:r>
-              <a:rPr lang="en-US" sz="1400" dirty="0" smtClean="0">
+              <a:rPr lang="en-US" sz="1400" dirty="0">
                 <a:latin typeface="Courier New" panose="02070309020205020404" pitchFamily="49" charset="0"/>
                 <a:cs typeface="Courier New" panose="02070309020205020404" pitchFamily="49" charset="0"/>
               </a:rPr>
@@ -16379,24 +16921,17 @@
                 <a:latin typeface="Courier New" panose="02070309020205020404" pitchFamily="49" charset="0"/>
                 <a:cs typeface="Courier New" panose="02070309020205020404" pitchFamily="49" charset="0"/>
               </a:rPr>
-              <a:t> </a:t>
-            </a:r>
-            <a:r>
-              <a:rPr lang="en-US" sz="1400" dirty="0" smtClean="0">
-                <a:latin typeface="Courier New" panose="02070309020205020404" pitchFamily="49" charset="0"/>
-                <a:cs typeface="Courier New" panose="02070309020205020404" pitchFamily="49" charset="0"/>
-              </a:rPr>
-              <a:t>     </a:t>
-            </a:r>
-            <a:r>
-              <a:rPr lang="en-US" sz="1400" dirty="0" err="1" smtClean="0">
+              <a:t>      </a:t>
+            </a:r>
+            <a:r>
+              <a:rPr lang="en-US" sz="1400" dirty="0" err="1">
                 <a:latin typeface="Courier New" panose="02070309020205020404" pitchFamily="49" charset="0"/>
                 <a:cs typeface="Courier New" panose="02070309020205020404" pitchFamily="49" charset="0"/>
               </a:rPr>
               <a:t>System.out.println</a:t>
             </a:r>
             <a:r>
-              <a:rPr lang="en-US" sz="1400" dirty="0" smtClean="0">
+              <a:rPr lang="en-US" sz="1400" dirty="0">
                 <a:latin typeface="Courier New" panose="02070309020205020404" pitchFamily="49" charset="0"/>
                 <a:cs typeface="Courier New" panose="02070309020205020404" pitchFamily="49" charset="0"/>
               </a:rPr>
@@ -16422,24 +16957,17 @@
                 <a:latin typeface="Courier New" panose="02070309020205020404" pitchFamily="49" charset="0"/>
                 <a:cs typeface="Courier New" panose="02070309020205020404" pitchFamily="49" charset="0"/>
               </a:rPr>
-              <a:t> </a:t>
-            </a:r>
-            <a:r>
-              <a:rPr lang="en-US" sz="1400" dirty="0" smtClean="0">
-                <a:latin typeface="Courier New" panose="02070309020205020404" pitchFamily="49" charset="0"/>
-                <a:cs typeface="Courier New" panose="02070309020205020404" pitchFamily="49" charset="0"/>
-              </a:rPr>
-              <a:t>     </a:t>
-            </a:r>
-            <a:r>
-              <a:rPr lang="en-US" sz="1400" dirty="0" err="1" smtClean="0">
+              <a:t>      </a:t>
+            </a:r>
+            <a:r>
+              <a:rPr lang="en-US" sz="1400" dirty="0" err="1">
                 <a:latin typeface="Courier New" panose="02070309020205020404" pitchFamily="49" charset="0"/>
                 <a:cs typeface="Courier New" panose="02070309020205020404" pitchFamily="49" charset="0"/>
               </a:rPr>
               <a:t>System.out.println</a:t>
             </a:r>
             <a:r>
-              <a:rPr lang="en-US" sz="1400" dirty="0" smtClean="0">
+              <a:rPr lang="en-US" sz="1400" dirty="0">
                 <a:latin typeface="Courier New" panose="02070309020205020404" pitchFamily="49" charset="0"/>
                 <a:cs typeface="Courier New" panose="02070309020205020404" pitchFamily="49" charset="0"/>
               </a:rPr>
@@ -16465,24 +16993,17 @@
                 <a:latin typeface="Courier New" panose="02070309020205020404" pitchFamily="49" charset="0"/>
                 <a:cs typeface="Courier New" panose="02070309020205020404" pitchFamily="49" charset="0"/>
               </a:rPr>
-              <a:t> </a:t>
-            </a:r>
-            <a:r>
-              <a:rPr lang="en-US" sz="1400" dirty="0" smtClean="0">
-                <a:latin typeface="Courier New" panose="02070309020205020404" pitchFamily="49" charset="0"/>
-                <a:cs typeface="Courier New" panose="02070309020205020404" pitchFamily="49" charset="0"/>
-              </a:rPr>
-              <a:t>     </a:t>
-            </a:r>
-            <a:r>
-              <a:rPr lang="en-US" sz="1400" dirty="0" err="1" smtClean="0">
+              <a:t>      </a:t>
+            </a:r>
+            <a:r>
+              <a:rPr lang="en-US" sz="1400" dirty="0" err="1">
                 <a:latin typeface="Courier New" panose="02070309020205020404" pitchFamily="49" charset="0"/>
                 <a:cs typeface="Courier New" panose="02070309020205020404" pitchFamily="49" charset="0"/>
               </a:rPr>
               <a:t>System.out.println</a:t>
             </a:r>
             <a:r>
-              <a:rPr lang="en-US" sz="1400" dirty="0" smtClean="0">
+              <a:rPr lang="en-US" sz="1400" dirty="0">
                 <a:latin typeface="Courier New" panose="02070309020205020404" pitchFamily="49" charset="0"/>
                 <a:cs typeface="Courier New" panose="02070309020205020404" pitchFamily="49" charset="0"/>
               </a:rPr>
@@ -16504,7 +17025,7 @@
               <a:buNone/>
             </a:pPr>
             <a:r>
-              <a:rPr lang="en-US" sz="1400" dirty="0" smtClean="0">
+              <a:rPr lang="en-US" sz="1400" dirty="0">
                 <a:latin typeface="Courier New" panose="02070309020205020404" pitchFamily="49" charset="0"/>
                 <a:cs typeface="Courier New" panose="02070309020205020404" pitchFamily="49" charset="0"/>
               </a:rPr>
@@ -16526,7 +17047,7 @@
               <a:buNone/>
             </a:pPr>
             <a:r>
-              <a:rPr lang="en-US" sz="1400" dirty="0" smtClean="0">
+              <a:rPr lang="en-US" sz="1400" dirty="0">
                 <a:latin typeface="Courier New" panose="02070309020205020404" pitchFamily="49" charset="0"/>
                 <a:cs typeface="Courier New" panose="02070309020205020404" pitchFamily="49" charset="0"/>
               </a:rPr>
@@ -16548,7 +17069,7 @@
               <a:buNone/>
             </a:pPr>
             <a:r>
-              <a:rPr lang="en-US" sz="1400" dirty="0" smtClean="0">
+              <a:rPr lang="en-US" sz="1400" dirty="0">
                 <a:latin typeface="Courier New" panose="02070309020205020404" pitchFamily="49" charset="0"/>
                 <a:cs typeface="Courier New" panose="02070309020205020404" pitchFamily="49" charset="0"/>
               </a:rPr>
@@ -16570,7 +17091,7 @@
               <a:buNone/>
             </a:pPr>
             <a:r>
-              <a:rPr lang="en-US" sz="1400" dirty="0" smtClean="0">
+              <a:rPr lang="en-US" sz="1400" dirty="0">
                 <a:latin typeface="Courier New" panose="02070309020205020404" pitchFamily="49" charset="0"/>
                 <a:cs typeface="Courier New" panose="02070309020205020404" pitchFamily="49" charset="0"/>
               </a:rPr>
@@ -16592,7 +17113,7 @@
               <a:buNone/>
             </a:pPr>
             <a:r>
-              <a:rPr lang="en-US" sz="1400" dirty="0" smtClean="0">
+              <a:rPr lang="en-US" sz="1400" dirty="0">
                 <a:latin typeface="Courier New" panose="02070309020205020404" pitchFamily="49" charset="0"/>
                 <a:cs typeface="Courier New" panose="02070309020205020404" pitchFamily="49" charset="0"/>
               </a:rPr>
@@ -16614,7 +17135,7 @@
               <a:buNone/>
             </a:pPr>
             <a:r>
-              <a:rPr lang="en-US" sz="1400" dirty="0" smtClean="0">
+              <a:rPr lang="en-US" sz="1400" dirty="0">
                 <a:latin typeface="Courier New" panose="02070309020205020404" pitchFamily="49" charset="0"/>
                 <a:cs typeface="Courier New" panose="02070309020205020404" pitchFamily="49" charset="0"/>
               </a:rPr>
@@ -16636,21 +17157,21 @@
               <a:buNone/>
             </a:pPr>
             <a:r>
-              <a:rPr lang="en-US" sz="1400" dirty="0" smtClean="0">
+              <a:rPr lang="en-US" sz="1400" dirty="0">
                 <a:latin typeface="Courier New" panose="02070309020205020404" pitchFamily="49" charset="0"/>
                 <a:cs typeface="Courier New" panose="02070309020205020404" pitchFamily="49" charset="0"/>
               </a:rPr>
               <a:t>      </a:t>
             </a:r>
             <a:r>
-              <a:rPr lang="en-US" sz="1400" dirty="0" err="1" smtClean="0">
+              <a:rPr lang="en-US" sz="1400" dirty="0" err="1">
                 <a:latin typeface="Courier New" panose="02070309020205020404" pitchFamily="49" charset="0"/>
                 <a:cs typeface="Courier New" panose="02070309020205020404" pitchFamily="49" charset="0"/>
               </a:rPr>
               <a:t>System.out.println</a:t>
             </a:r>
             <a:r>
-              <a:rPr lang="en-US" sz="1400" dirty="0" smtClean="0">
+              <a:rPr lang="en-US" sz="1400" dirty="0">
                 <a:latin typeface="Courier New" panose="02070309020205020404" pitchFamily="49" charset="0"/>
                 <a:cs typeface="Courier New" panose="02070309020205020404" pitchFamily="49" charset="0"/>
               </a:rPr>
@@ -16672,21 +17193,21 @@
               <a:buNone/>
             </a:pPr>
             <a:r>
-              <a:rPr lang="en-US" sz="1400" dirty="0" smtClean="0">
+              <a:rPr lang="en-US" sz="1400" dirty="0">
                 <a:latin typeface="Courier New" panose="02070309020205020404" pitchFamily="49" charset="0"/>
                 <a:cs typeface="Courier New" panose="02070309020205020404" pitchFamily="49" charset="0"/>
               </a:rPr>
               <a:t>      </a:t>
             </a:r>
             <a:r>
-              <a:rPr lang="en-US" sz="1400" dirty="0" err="1" smtClean="0">
+              <a:rPr lang="en-US" sz="1400" dirty="0" err="1">
                 <a:latin typeface="Courier New" panose="02070309020205020404" pitchFamily="49" charset="0"/>
                 <a:cs typeface="Courier New" panose="02070309020205020404" pitchFamily="49" charset="0"/>
               </a:rPr>
               <a:t>System.out.println</a:t>
             </a:r>
             <a:r>
-              <a:rPr lang="en-US" sz="1400" dirty="0" smtClean="0">
+              <a:rPr lang="en-US" sz="1400" dirty="0">
                 <a:latin typeface="Courier New" panose="02070309020205020404" pitchFamily="49" charset="0"/>
                 <a:cs typeface="Courier New" panose="02070309020205020404" pitchFamily="49" charset="0"/>
               </a:rPr>
@@ -16708,21 +17229,21 @@
               <a:buNone/>
             </a:pPr>
             <a:r>
-              <a:rPr lang="en-US" sz="1400" dirty="0" smtClean="0">
+              <a:rPr lang="en-US" sz="1400" dirty="0">
                 <a:latin typeface="Courier New" panose="02070309020205020404" pitchFamily="49" charset="0"/>
                 <a:cs typeface="Courier New" panose="02070309020205020404" pitchFamily="49" charset="0"/>
               </a:rPr>
               <a:t>      </a:t>
             </a:r>
             <a:r>
-              <a:rPr lang="en-US" sz="1400" dirty="0" err="1" smtClean="0">
+              <a:rPr lang="en-US" sz="1400" dirty="0" err="1">
                 <a:latin typeface="Courier New" panose="02070309020205020404" pitchFamily="49" charset="0"/>
                 <a:cs typeface="Courier New" panose="02070309020205020404" pitchFamily="49" charset="0"/>
               </a:rPr>
               <a:t>System.out.println</a:t>
             </a:r>
             <a:r>
-              <a:rPr lang="en-US" sz="1400" dirty="0" smtClean="0">
+              <a:rPr lang="en-US" sz="1400" dirty="0">
                 <a:latin typeface="Courier New" panose="02070309020205020404" pitchFamily="49" charset="0"/>
                 <a:cs typeface="Courier New" panose="02070309020205020404" pitchFamily="49" charset="0"/>
               </a:rPr>
@@ -16744,21 +17265,21 @@
               <a:buNone/>
             </a:pPr>
             <a:r>
-              <a:rPr lang="en-US" sz="1400" dirty="0" smtClean="0">
+              <a:rPr lang="en-US" sz="1400" dirty="0">
                 <a:latin typeface="Courier New" panose="02070309020205020404" pitchFamily="49" charset="0"/>
                 <a:cs typeface="Courier New" panose="02070309020205020404" pitchFamily="49" charset="0"/>
               </a:rPr>
               <a:t>      </a:t>
             </a:r>
             <a:r>
-              <a:rPr lang="en-US" sz="1400" dirty="0" err="1" smtClean="0">
+              <a:rPr lang="en-US" sz="1400" dirty="0" err="1">
                 <a:latin typeface="Courier New" panose="02070309020205020404" pitchFamily="49" charset="0"/>
                 <a:cs typeface="Courier New" panose="02070309020205020404" pitchFamily="49" charset="0"/>
               </a:rPr>
               <a:t>System.out.println</a:t>
             </a:r>
             <a:r>
-              <a:rPr lang="en-US" sz="1400" dirty="0" smtClean="0">
+              <a:rPr lang="en-US" sz="1400" dirty="0">
                 <a:latin typeface="Courier New" panose="02070309020205020404" pitchFamily="49" charset="0"/>
                 <a:cs typeface="Courier New" panose="02070309020205020404" pitchFamily="49" charset="0"/>
               </a:rPr>
@@ -16780,7 +17301,7 @@
               <a:buNone/>
             </a:pPr>
             <a:r>
-              <a:rPr lang="en-US" sz="1400" dirty="0" smtClean="0">
+              <a:rPr lang="en-US" sz="1400" dirty="0">
                 <a:latin typeface="Courier New" panose="02070309020205020404" pitchFamily="49" charset="0"/>
                 <a:cs typeface="Courier New" panose="02070309020205020404" pitchFamily="49" charset="0"/>
               </a:rPr>
@@ -16802,16 +17323,12 @@
               <a:buNone/>
             </a:pPr>
             <a:r>
-              <a:rPr lang="en-US" sz="1400" dirty="0" smtClean="0">
+              <a:rPr lang="en-US" sz="1400" dirty="0">
                 <a:latin typeface="Courier New" panose="02070309020205020404" pitchFamily="49" charset="0"/>
                 <a:cs typeface="Courier New" panose="02070309020205020404" pitchFamily="49" charset="0"/>
               </a:rPr>
               <a:t>}</a:t>
             </a:r>
-            <a:endParaRPr lang="en-US" sz="1400" dirty="0">
-              <a:latin typeface="Courier New" panose="02070309020205020404" pitchFamily="49" charset="0"/>
-              <a:cs typeface="Courier New" panose="02070309020205020404" pitchFamily="49" charset="0"/>
-            </a:endParaRPr>
           </a:p>
         </p:txBody>
       </p:sp>
@@ -16863,7 +17380,7 @@
           <a:p>
             <a:pPr algn="ctr"/>
             <a:r>
-              <a:rPr lang="en-US" dirty="0" smtClean="0">
+              <a:rPr lang="en-US" dirty="0">
                 <a:solidFill>
                   <a:srgbClr val="092529"/>
                 </a:solidFill>
@@ -16873,14 +17390,6 @@
               </a:rPr>
               <a:t>How many different concepts are in the main method?</a:t>
             </a:r>
-            <a:endParaRPr lang="en-US" dirty="0">
-              <a:solidFill>
-                <a:srgbClr val="092529"/>
-              </a:solidFill>
-              <a:latin typeface="Proxima Nova" charset="0"/>
-              <a:ea typeface="Proxima Nova" charset="0"/>
-              <a:cs typeface="Proxima Nova" charset="0"/>
-            </a:endParaRPr>
           </a:p>
         </p:txBody>
       </p:sp>
@@ -16932,7 +17441,7 @@
           <a:p>
             <a:pPr algn="ctr"/>
             <a:r>
-              <a:rPr lang="en-US" dirty="0" smtClean="0">
+              <a:rPr lang="en-US" dirty="0">
                 <a:solidFill>
                   <a:srgbClr val="092529"/>
                 </a:solidFill>
@@ -16942,14 +17451,6 @@
               </a:rPr>
               <a:t>Sum</a:t>
             </a:r>
-            <a:endParaRPr lang="en-US" dirty="0">
-              <a:solidFill>
-                <a:srgbClr val="092529"/>
-              </a:solidFill>
-              <a:latin typeface="Proxima Nova" charset="0"/>
-              <a:ea typeface="Proxima Nova" charset="0"/>
-              <a:cs typeface="Proxima Nova" charset="0"/>
-            </a:endParaRPr>
           </a:p>
         </p:txBody>
       </p:sp>
@@ -17001,7 +17502,7 @@
           <a:p>
             <a:pPr algn="ctr"/>
             <a:r>
-              <a:rPr lang="en-US" dirty="0" smtClean="0">
+              <a:rPr lang="en-US" dirty="0">
                 <a:solidFill>
                   <a:srgbClr val="092529"/>
                 </a:solidFill>
@@ -17011,14 +17512,6 @@
               </a:rPr>
               <a:t>Subtraction</a:t>
             </a:r>
-            <a:endParaRPr lang="en-US" dirty="0">
-              <a:solidFill>
-                <a:srgbClr val="092529"/>
-              </a:solidFill>
-              <a:latin typeface="Proxima Nova" charset="0"/>
-              <a:ea typeface="Proxima Nova" charset="0"/>
-              <a:cs typeface="Proxima Nova" charset="0"/>
-            </a:endParaRPr>
           </a:p>
         </p:txBody>
       </p:sp>
@@ -17070,7 +17563,7 @@
           <a:p>
             <a:pPr algn="ctr"/>
             <a:r>
-              <a:rPr lang="en-US" dirty="0" smtClean="0">
+              <a:rPr lang="en-US" dirty="0">
                 <a:solidFill>
                   <a:srgbClr val="092529"/>
                 </a:solidFill>
@@ -17080,14 +17573,6 @@
               </a:rPr>
               <a:t>Multiplication</a:t>
             </a:r>
-            <a:endParaRPr lang="en-US" dirty="0">
-              <a:solidFill>
-                <a:srgbClr val="092529"/>
-              </a:solidFill>
-              <a:latin typeface="Proxima Nova" charset="0"/>
-              <a:ea typeface="Proxima Nova" charset="0"/>
-              <a:cs typeface="Proxima Nova" charset="0"/>
-            </a:endParaRPr>
           </a:p>
         </p:txBody>
       </p:sp>
@@ -17139,7 +17624,7 @@
           <a:p>
             <a:pPr algn="ctr"/>
             <a:r>
-              <a:rPr lang="en-US" dirty="0" smtClean="0">
+              <a:rPr lang="en-US" dirty="0">
                 <a:solidFill>
                   <a:srgbClr val="092529"/>
                 </a:solidFill>
@@ -17149,14 +17634,6 @@
               </a:rPr>
               <a:t>Division</a:t>
             </a:r>
-            <a:endParaRPr lang="en-US" dirty="0">
-              <a:solidFill>
-                <a:srgbClr val="092529"/>
-              </a:solidFill>
-              <a:latin typeface="Proxima Nova" charset="0"/>
-              <a:ea typeface="Proxima Nova" charset="0"/>
-              <a:cs typeface="Proxima Nova" charset="0"/>
-            </a:endParaRPr>
           </a:p>
         </p:txBody>
       </p:sp>
@@ -17208,7 +17685,7 @@
           <a:p>
             <a:pPr algn="ctr"/>
             <a:r>
-              <a:rPr lang="en-US" dirty="0" smtClean="0">
+              <a:rPr lang="en-US" dirty="0">
                 <a:solidFill>
                   <a:srgbClr val="092529"/>
                 </a:solidFill>
@@ -17218,14 +17695,6 @@
               </a:rPr>
               <a:t>Print</a:t>
             </a:r>
-            <a:endParaRPr lang="en-US" dirty="0">
-              <a:solidFill>
-                <a:srgbClr val="092529"/>
-              </a:solidFill>
-              <a:latin typeface="Proxima Nova" charset="0"/>
-              <a:ea typeface="Proxima Nova" charset="0"/>
-              <a:cs typeface="Proxima Nova" charset="0"/>
-            </a:endParaRPr>
           </a:p>
         </p:txBody>
       </p:sp>
@@ -17822,470 +18291,6 @@
 </p:sld>
 </file>
 
-<file path=ppt/slides/slide8.xml><?xml version="1.0" encoding="utf-8"?>
-<p:sld xmlns:a="http://schemas.openxmlformats.org/drawingml/2006/main" xmlns:r="http://schemas.openxmlformats.org/officeDocument/2006/relationships" xmlns:p="http://schemas.openxmlformats.org/presentationml/2006/main">
-  <p:cSld>
-    <p:spTree>
-      <p:nvGrpSpPr>
-        <p:cNvPr id="1" name=""/>
-        <p:cNvGrpSpPr/>
-        <p:nvPr/>
-      </p:nvGrpSpPr>
-      <p:grpSpPr>
-        <a:xfrm>
-          <a:off x="0" y="0"/>
-          <a:ext cx="0" cy="0"/>
-          <a:chOff x="0" y="0"/>
-          <a:chExt cx="0" cy="0"/>
-        </a:xfrm>
-      </p:grpSpPr>
-      <p:sp>
-        <p:nvSpPr>
-          <p:cNvPr id="2" name="Title 1">
-            <a:extLst>
-              <a:ext uri="{FF2B5EF4-FFF2-40B4-BE49-F238E27FC236}">
-                <a16:creationId xmlns:a16="http://schemas.microsoft.com/office/drawing/2014/main" id="{0AC91572-99FC-2C40-9123-5231EE43E34F}"/>
-              </a:ext>
-            </a:extLst>
-          </p:cNvPr>
-          <p:cNvSpPr>
-            <a:spLocks noGrp="1"/>
-          </p:cNvSpPr>
-          <p:nvPr>
-            <p:ph type="title"/>
-          </p:nvPr>
-        </p:nvSpPr>
-        <p:spPr>
-          <a:xfrm>
-            <a:off x="628072" y="656904"/>
-            <a:ext cx="12561453" cy="1015663"/>
-          </a:xfrm>
-        </p:spPr>
-        <p:txBody>
-          <a:bodyPr/>
-          <a:lstStyle/>
-          <a:p>
-            <a:r>
-              <a:rPr lang="en-US" dirty="0"/>
-              <a:t>Objects are Building Blocks</a:t>
-            </a:r>
-          </a:p>
-        </p:txBody>
-      </p:sp>
-      <p:sp>
-        <p:nvSpPr>
-          <p:cNvPr id="3" name="Text Placeholder 2">
-            <a:extLst>
-              <a:ext uri="{FF2B5EF4-FFF2-40B4-BE49-F238E27FC236}">
-                <a16:creationId xmlns:a16="http://schemas.microsoft.com/office/drawing/2014/main" id="{A4FEB9CE-D22E-304F-98BA-26309D98AD8F}"/>
-              </a:ext>
-            </a:extLst>
-          </p:cNvPr>
-          <p:cNvSpPr>
-            <a:spLocks noGrp="1"/>
-          </p:cNvSpPr>
-          <p:nvPr>
-            <p:ph type="body" sz="quarter" idx="10"/>
-          </p:nvPr>
-        </p:nvSpPr>
-        <p:spPr>
-          <a:xfrm>
-            <a:off x="628072" y="1800240"/>
-            <a:ext cx="12561453" cy="5905591"/>
-          </a:xfrm>
-        </p:spPr>
-        <p:txBody>
-          <a:bodyPr/>
-          <a:lstStyle/>
-          <a:p>
-            <a:pPr fontAlgn="base"/>
-            <a:r>
-              <a:rPr lang="en-US" dirty="0"/>
-              <a:t>Think of LEGOs </a:t>
-            </a:r>
-          </a:p>
-          <a:p>
-            <a:pPr lvl="1" fontAlgn="base"/>
-            <a:r>
-              <a:rPr lang="en-US" dirty="0"/>
-              <a:t>Blocks </a:t>
-            </a:r>
-          </a:p>
-          <a:p>
-            <a:pPr lvl="1" fontAlgn="base"/>
-            <a:r>
-              <a:rPr lang="en-US" dirty="0"/>
-              <a:t>Assembled in different ways - creates new and interesting things</a:t>
-            </a:r>
-          </a:p>
-          <a:p>
-            <a:pPr fontAlgn="base"/>
-            <a:r>
-              <a:rPr lang="en-US" dirty="0"/>
-              <a:t>Objects contain information in a logical order </a:t>
-            </a:r>
-          </a:p>
-          <a:p>
-            <a:pPr fontAlgn="base"/>
-            <a:r>
-              <a:rPr lang="en-US" dirty="0"/>
-              <a:t>Example: </a:t>
-            </a:r>
-            <a:r>
-              <a:rPr lang="en-US" u="sng" dirty="0"/>
-              <a:t>Strings are objects</a:t>
-            </a:r>
-          </a:p>
-          <a:p>
-            <a:pPr lvl="1"/>
-            <a:r>
-              <a:rPr lang="en-US" dirty="0">
-                <a:latin typeface="Consolas" panose="020B0609020204030204" pitchFamily="49" charset="0"/>
-                <a:cs typeface="Consolas" panose="020B0609020204030204" pitchFamily="49" charset="0"/>
-              </a:rPr>
-              <a:t>String companion = “Clara”; // note, Strings are so common, they have this shortcut</a:t>
-            </a:r>
-          </a:p>
-          <a:p>
-            <a:pPr lvl="1"/>
-            <a:r>
-              <a:rPr lang="en-US" dirty="0" err="1">
-                <a:latin typeface="Consolas" panose="020B0609020204030204" pitchFamily="49" charset="0"/>
-                <a:cs typeface="Consolas" panose="020B0609020204030204" pitchFamily="49" charset="0"/>
-              </a:rPr>
-              <a:t>companion.length</a:t>
-            </a:r>
-            <a:r>
-              <a:rPr lang="en-US" dirty="0">
-                <a:latin typeface="Consolas" panose="020B0609020204030204" pitchFamily="49" charset="0"/>
-                <a:cs typeface="Consolas" panose="020B0609020204030204" pitchFamily="49" charset="0"/>
-              </a:rPr>
-              <a:t>(); // returns 5</a:t>
-            </a:r>
-          </a:p>
-          <a:p>
-            <a:pPr fontAlgn="base"/>
-            <a:r>
-              <a:rPr lang="en-US" dirty="0"/>
-              <a:t>Most objects use the </a:t>
-            </a:r>
-            <a:r>
-              <a:rPr lang="en-US" b="1" dirty="0"/>
-              <a:t>new</a:t>
-            </a:r>
-            <a:r>
-              <a:rPr lang="en-US" dirty="0"/>
-              <a:t> keyword</a:t>
-            </a:r>
-          </a:p>
-          <a:p>
-            <a:pPr lvl="1"/>
-            <a:r>
-              <a:rPr lang="en-US" dirty="0" err="1">
-                <a:latin typeface="Consolas" panose="020B0609020204030204" pitchFamily="49" charset="0"/>
-                <a:cs typeface="Consolas" panose="020B0609020204030204" pitchFamily="49" charset="0"/>
-              </a:rPr>
-              <a:t>MyCoolObject</a:t>
-            </a:r>
-            <a:r>
-              <a:rPr lang="en-US" dirty="0">
-                <a:latin typeface="Consolas" panose="020B0609020204030204" pitchFamily="49" charset="0"/>
-                <a:cs typeface="Consolas" panose="020B0609020204030204" pitchFamily="49" charset="0"/>
-              </a:rPr>
-              <a:t> obj = new </a:t>
-            </a:r>
-            <a:r>
-              <a:rPr lang="en-US" dirty="0" err="1">
-                <a:latin typeface="Consolas" panose="020B0609020204030204" pitchFamily="49" charset="0"/>
-                <a:cs typeface="Consolas" panose="020B0609020204030204" pitchFamily="49" charset="0"/>
-              </a:rPr>
-              <a:t>MyCoolObject</a:t>
-            </a:r>
-            <a:r>
-              <a:rPr lang="en-US" dirty="0">
-                <a:latin typeface="Consolas" panose="020B0609020204030204" pitchFamily="49" charset="0"/>
-                <a:cs typeface="Consolas" panose="020B0609020204030204" pitchFamily="49" charset="0"/>
-              </a:rPr>
-              <a:t>(); // this reserves room in memory</a:t>
-            </a:r>
-          </a:p>
-          <a:p>
-            <a:pPr lvl="1"/>
-            <a:r>
-              <a:rPr lang="en-US" dirty="0" err="1">
-                <a:latin typeface="Consolas" panose="020B0609020204030204" pitchFamily="49" charset="0"/>
-                <a:cs typeface="Consolas" panose="020B0609020204030204" pitchFamily="49" charset="0"/>
-              </a:rPr>
-              <a:t>obj.myCoolMethod</a:t>
-            </a:r>
-            <a:r>
-              <a:rPr lang="en-US" dirty="0">
-                <a:latin typeface="Consolas" panose="020B0609020204030204" pitchFamily="49" charset="0"/>
-                <a:cs typeface="Consolas" panose="020B0609020204030204" pitchFamily="49" charset="0"/>
-              </a:rPr>
-              <a:t>();</a:t>
-            </a:r>
-          </a:p>
-          <a:p>
-            <a:pPr fontAlgn="base"/>
-            <a:r>
-              <a:rPr lang="en-US" dirty="0"/>
-              <a:t>We will keep coming back to this</a:t>
-            </a:r>
-          </a:p>
-          <a:p>
-            <a:pPr lvl="1" fontAlgn="base"/>
-            <a:r>
-              <a:rPr lang="en-US" dirty="0"/>
-              <a:t>Important to know - methods belong to Objects</a:t>
-            </a:r>
-          </a:p>
-          <a:p>
-            <a:pPr lvl="1" fontAlgn="base"/>
-            <a:r>
-              <a:rPr lang="en-US" dirty="0"/>
-              <a:t>Even methods that </a:t>
-            </a:r>
-            <a:r>
-              <a:rPr lang="en-US" b="1" dirty="0"/>
-              <a:t>you</a:t>
-            </a:r>
-            <a:r>
-              <a:rPr lang="en-US" dirty="0"/>
-              <a:t> write</a:t>
-            </a:r>
-          </a:p>
-          <a:p>
-            <a:endParaRPr lang="en-US" dirty="0"/>
-          </a:p>
-        </p:txBody>
-      </p:sp>
-      <p:sp>
-        <p:nvSpPr>
-          <p:cNvPr id="5" name="Rectangle 3">
-            <a:extLst>
-              <a:ext uri="{FF2B5EF4-FFF2-40B4-BE49-F238E27FC236}">
-                <a16:creationId xmlns:a16="http://schemas.microsoft.com/office/drawing/2014/main" id="{1B52B995-A490-EF4B-81C8-8848A14EA2C6}"/>
-              </a:ext>
-            </a:extLst>
-          </p:cNvPr>
-          <p:cNvSpPr>
-            <a:spLocks noChangeArrowheads="1"/>
-          </p:cNvSpPr>
-          <p:nvPr/>
-        </p:nvSpPr>
-        <p:spPr bwMode="auto">
-          <a:xfrm>
-            <a:off x="10398100" y="2365663"/>
-            <a:ext cx="3328155" cy="184666"/>
-          </a:xfrm>
-          <a:prstGeom prst="rect">
-            <a:avLst/>
-          </a:prstGeom>
-          <a:noFill/>
-          <a:ln>
-            <a:noFill/>
-          </a:ln>
-          <a:effectLst/>
-          <a:extLst>
-            <a:ext uri="{909E8E84-426E-40DD-AFC4-6F175D3DCCD1}">
-              <a14:hiddenFill xmlns:a14="http://schemas.microsoft.com/office/drawing/2010/main">
-                <a:solidFill>
-                  <a:schemeClr val="accent1"/>
-                </a:solidFill>
-              </a14:hiddenFill>
-            </a:ext>
-            <a:ext uri="{91240B29-F687-4F45-9708-019B960494DF}">
-              <a14:hiddenLine xmlns:a14="http://schemas.microsoft.com/office/drawing/2010/main" w="9525">
-                <a:solidFill>
-                  <a:schemeClr val="tx1"/>
-                </a:solidFill>
-                <a:miter lim="800000"/>
-                <a:headEnd/>
-                <a:tailEnd/>
-              </a14:hiddenLine>
-            </a:ext>
-            <a:ext uri="{AF507438-7753-43E0-B8FC-AC1667EBCBE1}">
-              <a14:hiddenEffects xmlns:a14="http://schemas.microsoft.com/office/drawing/2010/main">
-                <a:effectLst>
-                  <a:outerShdw dist="35921" dir="2700000" algn="ctr" rotWithShape="0">
-                    <a:schemeClr val="bg2"/>
-                  </a:outerShdw>
-                </a:effectLst>
-              </a14:hiddenEffects>
-            </a:ext>
-          </a:extLst>
-        </p:spPr>
-        <p:txBody>
-          <a:bodyPr vert="horz" wrap="none" lIns="91440" tIns="45720" rIns="91440" bIns="45720" numCol="1" anchor="ctr" anchorCtr="0" compatLnSpc="1">
-            <a:prstTxWarp prst="textNoShape">
-              <a:avLst/>
-            </a:prstTxWarp>
-            <a:spAutoFit/>
-          </a:bodyPr>
-          <a:lstStyle/>
-          <a:p>
-            <a:pPr marL="0" marR="0" lvl="0" indent="0" algn="l" defTabSz="914400" rtl="0" eaLnBrk="0" fontAlgn="base" latinLnBrk="0" hangingPunct="0">
-              <a:lnSpc>
-                <a:spcPct val="100000"/>
-              </a:lnSpc>
-              <a:spcBef>
-                <a:spcPct val="0"/>
-              </a:spcBef>
-              <a:spcAft>
-                <a:spcPct val="0"/>
-              </a:spcAft>
-              <a:buClrTx/>
-              <a:buSzTx/>
-              <a:buFontTx/>
-              <a:buNone/>
-              <a:tabLst/>
-            </a:pPr>
-            <a:r>
-              <a:rPr kumimoji="0" lang="en-US" altLang="en-US" sz="600" b="0" i="0" u="sng" strike="noStrike" cap="none" normalizeH="0" baseline="0" dirty="0">
-                <a:ln>
-                  <a:noFill/>
-                </a:ln>
-                <a:solidFill>
-                  <a:srgbClr val="3246A4"/>
-                </a:solidFill>
-                <a:effectLst/>
-                <a:latin typeface="Proxima Nova"/>
-                <a:hlinkClick r:id="rId2"/>
-              </a:rPr>
-              <a:t>© Ralf Roletschek</a:t>
-            </a:r>
-            <a:r>
-              <a:rPr kumimoji="0" lang="en-US" altLang="en-US" sz="600" b="0" i="0" u="none" strike="noStrike" cap="none" normalizeH="0" baseline="0" dirty="0">
-                <a:ln>
-                  <a:noFill/>
-                </a:ln>
-                <a:solidFill>
-                  <a:srgbClr val="000000"/>
-                </a:solidFill>
-                <a:effectLst/>
-                <a:latin typeface="Proxima Nova"/>
-              </a:rPr>
-              <a:t> - Published with permission. Read full copy information on </a:t>
-            </a:r>
-            <a:r>
-              <a:rPr kumimoji="0" lang="en-US" altLang="en-US" sz="600" b="0" i="0" u="sng" strike="noStrike" cap="none" normalizeH="0" baseline="0" dirty="0">
-                <a:ln>
-                  <a:noFill/>
-                </a:ln>
-                <a:solidFill>
-                  <a:srgbClr val="3246A4"/>
-                </a:solidFill>
-                <a:effectLst/>
-                <a:latin typeface="Proxima Nova"/>
-                <a:hlinkClick r:id="rId3"/>
-              </a:rPr>
-              <a:t>wikicommons</a:t>
-            </a:r>
-            <a:r>
-              <a:rPr kumimoji="0" lang="en-US" altLang="en-US" sz="600" b="0" i="0" u="none" strike="noStrike" cap="none" normalizeH="0" baseline="0" dirty="0">
-                <a:ln>
-                  <a:noFill/>
-                </a:ln>
-                <a:solidFill>
-                  <a:srgbClr val="000000"/>
-                </a:solidFill>
-                <a:effectLst/>
-                <a:latin typeface="Proxima Nova"/>
-              </a:rPr>
-              <a:t>. </a:t>
-            </a:r>
-            <a:endParaRPr kumimoji="0" lang="en-US" altLang="en-US" sz="1000" b="0" i="0" u="none" strike="noStrike" cap="none" normalizeH="0" baseline="0" dirty="0">
-              <a:ln>
-                <a:noFill/>
-              </a:ln>
-              <a:solidFill>
-                <a:schemeClr val="tx1"/>
-              </a:solidFill>
-              <a:effectLst/>
-            </a:endParaRPr>
-          </a:p>
-        </p:txBody>
-      </p:sp>
-      <p:pic>
-        <p:nvPicPr>
-          <p:cNvPr id="2052" name="Picture 4">
-            <a:extLst>
-              <a:ext uri="{FF2B5EF4-FFF2-40B4-BE49-F238E27FC236}">
-                <a16:creationId xmlns:a16="http://schemas.microsoft.com/office/drawing/2014/main" id="{D16D9799-4DC8-2C49-A07F-263769ED541E}"/>
-              </a:ext>
-            </a:extLst>
-          </p:cNvPr>
-          <p:cNvPicPr>
-            <a:picLocks noChangeAspect="1" noChangeArrowheads="1"/>
-          </p:cNvPicPr>
-          <p:nvPr/>
-        </p:nvPicPr>
-        <p:blipFill>
-          <a:blip r:embed="rId4">
-            <a:extLst>
-              <a:ext uri="{28A0092B-C50C-407E-A947-70E740481C1C}">
-                <a14:useLocalDpi xmlns:a14="http://schemas.microsoft.com/office/drawing/2010/main" val="0"/>
-              </a:ext>
-            </a:extLst>
-          </a:blip>
-          <a:srcRect/>
-          <a:stretch>
-            <a:fillRect/>
-          </a:stretch>
-        </p:blipFill>
-        <p:spPr bwMode="auto">
-          <a:xfrm>
-            <a:off x="10306756" y="0"/>
-            <a:ext cx="3510844" cy="2330323"/>
-          </a:xfrm>
-          <a:prstGeom prst="rect">
-            <a:avLst/>
-          </a:prstGeom>
-          <a:noFill/>
-          <a:extLst>
-            <a:ext uri="{909E8E84-426E-40DD-AFC4-6F175D3DCCD1}">
-              <a14:hiddenFill xmlns:a14="http://schemas.microsoft.com/office/drawing/2010/main">
-                <a:solidFill>
-                  <a:srgbClr val="FFFFFF"/>
-                </a:solidFill>
-              </a14:hiddenFill>
-            </a:ext>
-          </a:extLst>
-        </p:spPr>
-      </p:pic>
-    </p:spTree>
-    <p:extLst>
-      <p:ext uri="{BB962C8B-B14F-4D97-AF65-F5344CB8AC3E}">
-        <p14:creationId xmlns:p14="http://schemas.microsoft.com/office/powerpoint/2010/main" val="991584921"/>
-      </p:ext>
-    </p:extLst>
-  </p:cSld>
-  <p:clrMapOvr>
-    <a:masterClrMapping/>
-  </p:clrMapOvr>
-  <mc:AlternateContent xmlns:mc="http://schemas.openxmlformats.org/markup-compatibility/2006" xmlns:p14="http://schemas.microsoft.com/office/powerpoint/2010/main">
-    <mc:Choice Requires="p14">
-      <p:transition p14:dur="300">
-        <p:fade/>
-      </p:transition>
-    </mc:Choice>
-    <mc:Fallback xmlns="">
-      <p:transition>
-        <p:fade/>
-      </p:transition>
-    </mc:Fallback>
-  </mc:AlternateContent>
-  <p:timing>
-    <p:tnLst>
-      <p:par>
-        <p:cTn id="1" dur="indefinite" restart="never" nodeType="tmRoot"/>
-      </p:par>
-    </p:tnLst>
-  </p:timing>
-</p:sld>
-</file>
-
 <file path=ppt/slides/slide9.xml><?xml version="1.0" encoding="utf-8"?>
 <p:sld xmlns:a="http://schemas.openxmlformats.org/drawingml/2006/main" xmlns:r="http://schemas.openxmlformats.org/officeDocument/2006/relationships" xmlns:p="http://schemas.openxmlformats.org/presentationml/2006/main">
   <p:cSld>
@@ -18308,7 +18313,7 @@
           <p:cNvPr id="2" name="Title 1">
             <a:extLst>
               <a:ext uri="{FF2B5EF4-FFF2-40B4-BE49-F238E27FC236}">
-                <a16:creationId xmlns:a16="http://schemas.microsoft.com/office/drawing/2014/main" id="{EAD74ED9-56BF-3F4A-8E26-0C10999B1A0C}"/>
+                <a16:creationId xmlns:a16="http://schemas.microsoft.com/office/drawing/2014/main" id="{63A11866-F6CA-8E4A-B84A-EDF0EF478F9E}"/>
               </a:ext>
             </a:extLst>
           </p:cNvPr>
@@ -18326,7 +18331,7 @@
           <a:p>
             <a:r>
               <a:rPr lang="en-US" dirty="0"/>
-              <a:t>Reading Check-in </a:t>
+              <a:t>Quick Practice One</a:t>
             </a:r>
           </a:p>
         </p:txBody>
@@ -18336,7 +18341,7 @@
           <p:cNvPr id="3" name="Text Placeholder 2">
             <a:extLst>
               <a:ext uri="{FF2B5EF4-FFF2-40B4-BE49-F238E27FC236}">
-                <a16:creationId xmlns:a16="http://schemas.microsoft.com/office/drawing/2014/main" id="{B28E42E1-569F-B347-A47A-1501D7874CF8}"/>
+                <a16:creationId xmlns:a16="http://schemas.microsoft.com/office/drawing/2014/main" id="{CFFEA6B1-16B0-644E-9D4D-563305EEA4D8}"/>
               </a:ext>
             </a:extLst>
           </p:cNvPr>
@@ -18350,104 +18355,381 @@
         <p:spPr>
           <a:xfrm>
             <a:off x="628075" y="2487883"/>
-            <a:ext cx="12561453" cy="3412601"/>
+            <a:ext cx="12561453" cy="1453924"/>
           </a:xfrm>
         </p:spPr>
         <p:txBody>
           <a:bodyPr/>
           <a:lstStyle/>
           <a:p>
-            <a:pPr marL="0" indent="0">
-              <a:buNone/>
-            </a:pPr>
+            <a:r>
+              <a:rPr lang="en-US" dirty="0"/>
+              <a:t>As a group, block out / outline what you need to do for the </a:t>
+            </a:r>
             <a:r>
               <a:rPr lang="en-US" b="1" dirty="0"/>
-              <a:t>Which of the following are valid method “signatures”</a:t>
-            </a:r>
-          </a:p>
-          <a:p>
-            <a:pPr>
-              <a:buFont typeface="+mj-lt"/>
-              <a:buAutoNum type="alphaUcPeriod"/>
-            </a:pPr>
+              <a:t>multiplication </a:t>
+            </a:r>
             <a:r>
               <a:rPr lang="en-US" dirty="0"/>
-              <a:t>public double </a:t>
-            </a:r>
-            <a:r>
-              <a:rPr lang="en-US" dirty="0" err="1"/>
-              <a:t>calcArea</a:t>
-            </a:r>
+              <a:t>method.</a:t>
+            </a:r>
+          </a:p>
+          <a:p>
             <a:r>
               <a:rPr lang="en-US" dirty="0"/>
-              <a:t>(double width, double height) {}</a:t>
-            </a:r>
-          </a:p>
-          <a:p>
-            <a:pPr>
-              <a:buFont typeface="+mj-lt"/>
-              <a:buAutoNum type="alphaUcPeriod"/>
-            </a:pPr>
-            <a:r>
+              <a:t>For example:</a:t>
+            </a:r>
+          </a:p>
+          <a:p>
+            <a:endParaRPr lang="en-US" dirty="0"/>
+          </a:p>
+        </p:txBody>
+      </p:sp>
+      <p:sp>
+        <p:nvSpPr>
+          <p:cNvPr id="4" name="TextBox 3">
+            <a:extLst>
+              <a:ext uri="{FF2B5EF4-FFF2-40B4-BE49-F238E27FC236}">
+                <a16:creationId xmlns:a16="http://schemas.microsoft.com/office/drawing/2014/main" id="{C942D972-EB81-F94E-8B57-AB6BAD18B850}"/>
+              </a:ext>
+            </a:extLst>
+          </p:cNvPr>
+          <p:cNvSpPr txBox="1"/>
+          <p:nvPr/>
+        </p:nvSpPr>
+        <p:spPr>
+          <a:xfrm>
+            <a:off x="2128117" y="3599095"/>
+            <a:ext cx="10623421" cy="2246769"/>
+          </a:xfrm>
+          <a:prstGeom prst="rect">
+            <a:avLst/>
+          </a:prstGeom>
+          <a:noFill/>
+        </p:spPr>
+        <p:txBody>
+          <a:bodyPr wrap="none" rtlCol="0">
+            <a:spAutoFit/>
+          </a:bodyPr>
+          <a:lstStyle/>
+          <a:p>
+            <a:r>
+              <a:rPr lang="en-US" dirty="0">
+                <a:latin typeface="Consolas" panose="020B0609020204030204" pitchFamily="49" charset="0"/>
+                <a:cs typeface="Consolas" panose="020B0609020204030204" pitchFamily="49" charset="0"/>
+              </a:rPr>
+              <a:t>// what do I need to work? – values to add, so takes in two parameters</a:t>
+            </a:r>
+          </a:p>
+          <a:p>
+            <a:r>
+              <a:rPr lang="en-US" dirty="0">
+                <a:latin typeface="Consolas" panose="020B0609020204030204" pitchFamily="49" charset="0"/>
+                <a:cs typeface="Consolas" panose="020B0609020204030204" pitchFamily="49" charset="0"/>
+              </a:rPr>
+              <a:t>// what do I need to do? (quest!) Add the two values and return the result</a:t>
+            </a:r>
+          </a:p>
+          <a:p>
+            <a:r>
+              <a:rPr lang="en-US" dirty="0">
+                <a:latin typeface="Consolas" panose="020B0609020204030204" pitchFamily="49" charset="0"/>
+                <a:cs typeface="Consolas" panose="020B0609020204030204" pitchFamily="49" charset="0"/>
+              </a:rPr>
+              <a:t>// what is my return type then? double if my params are double..</a:t>
+            </a:r>
+          </a:p>
+          <a:p>
+            <a:r>
+              <a:rPr lang="en-US" dirty="0">
+                <a:latin typeface="Consolas" panose="020B0609020204030204" pitchFamily="49" charset="0"/>
+                <a:cs typeface="Consolas" panose="020B0609020204030204" pitchFamily="49" charset="0"/>
+              </a:rPr>
+              <a:t>// what else do I know / what else can I work with?</a:t>
+            </a:r>
+            <a:br>
+              <a:rPr lang="en-US" dirty="0">
+                <a:latin typeface="Consolas" panose="020B0609020204030204" pitchFamily="49" charset="0"/>
+                <a:cs typeface="Consolas" panose="020B0609020204030204" pitchFamily="49" charset="0"/>
+              </a:rPr>
+            </a:br>
+            <a:r>
+              <a:rPr lang="en-US" dirty="0">
+                <a:latin typeface="Consolas" panose="020B0609020204030204" pitchFamily="49" charset="0"/>
+                <a:cs typeface="Consolas" panose="020B0609020204030204" pitchFamily="49" charset="0"/>
+              </a:rPr>
+              <a:t>//  ---method is self contained,  no need to add anything else</a:t>
+            </a:r>
+          </a:p>
+          <a:p>
+            <a:r>
+              <a:rPr lang="en-US" dirty="0">
+                <a:latin typeface="Consolas" panose="020B0609020204030204" pitchFamily="49" charset="0"/>
+                <a:cs typeface="Consolas" panose="020B0609020204030204" pitchFamily="49" charset="0"/>
+              </a:rPr>
+              <a:t>//  --- self contained – good place to make it static</a:t>
+            </a:r>
+          </a:p>
+          <a:p>
+            <a:endParaRPr lang="en-US" dirty="0">
+              <a:latin typeface="Consolas" panose="020B0609020204030204" pitchFamily="49" charset="0"/>
+              <a:cs typeface="Consolas" panose="020B0609020204030204" pitchFamily="49" charset="0"/>
+            </a:endParaRPr>
+          </a:p>
+        </p:txBody>
+      </p:sp>
+      <p:sp>
+        <p:nvSpPr>
+          <p:cNvPr id="6" name="TextBox 5">
+            <a:extLst>
+              <a:ext uri="{FF2B5EF4-FFF2-40B4-BE49-F238E27FC236}">
+                <a16:creationId xmlns:a16="http://schemas.microsoft.com/office/drawing/2014/main" id="{0E633542-4261-2845-9C92-F1E1FAC64D55}"/>
+              </a:ext>
+            </a:extLst>
+          </p:cNvPr>
+          <p:cNvSpPr txBox="1"/>
+          <p:nvPr/>
+        </p:nvSpPr>
+        <p:spPr>
+          <a:xfrm>
+            <a:off x="2521132" y="5543702"/>
+            <a:ext cx="8223067" cy="1323439"/>
+          </a:xfrm>
+          <a:prstGeom prst="rect">
+            <a:avLst/>
+          </a:prstGeom>
+          <a:noFill/>
+        </p:spPr>
+        <p:txBody>
+          <a:bodyPr wrap="square">
+            <a:spAutoFit/>
+          </a:bodyPr>
+          <a:lstStyle/>
+          <a:p>
+            <a:r>
+              <a:rPr lang="en-US" dirty="0">
+                <a:solidFill>
+                  <a:srgbClr val="CC7832"/>
+                </a:solidFill>
+                <a:effectLst/>
+                <a:latin typeface="Consolas" panose="020B0609020204030204" pitchFamily="49" charset="0"/>
+                <a:cs typeface="Consolas" panose="020B0609020204030204" pitchFamily="49" charset="0"/>
+              </a:rPr>
+              <a:t>public static double </a:t>
+            </a:r>
+            <a:r>
+              <a:rPr lang="en-US" dirty="0">
+                <a:solidFill>
+                  <a:srgbClr val="FFC66D"/>
+                </a:solidFill>
+                <a:effectLst/>
+                <a:latin typeface="Consolas" panose="020B0609020204030204" pitchFamily="49" charset="0"/>
+                <a:cs typeface="Consolas" panose="020B0609020204030204" pitchFamily="49" charset="0"/>
+              </a:rPr>
+              <a:t>sum</a:t>
+            </a:r>
+            <a:r>
+              <a:rPr lang="en-US" dirty="0">
+                <a:latin typeface="Consolas" panose="020B0609020204030204" pitchFamily="49" charset="0"/>
+                <a:cs typeface="Consolas" panose="020B0609020204030204" pitchFamily="49" charset="0"/>
+              </a:rPr>
+              <a:t>(</a:t>
+            </a:r>
+            <a:r>
+              <a:rPr lang="en-US" dirty="0">
+                <a:solidFill>
+                  <a:srgbClr val="CC7832"/>
+                </a:solidFill>
+                <a:effectLst/>
+                <a:latin typeface="Consolas" panose="020B0609020204030204" pitchFamily="49" charset="0"/>
+                <a:cs typeface="Consolas" panose="020B0609020204030204" pitchFamily="49" charset="0"/>
+              </a:rPr>
+              <a:t>double </a:t>
+            </a:r>
+            <a:r>
+              <a:rPr lang="en-US" i="1" dirty="0">
+                <a:solidFill>
+                  <a:srgbClr val="9876AA"/>
+                </a:solidFill>
+                <a:effectLst/>
+                <a:latin typeface="Consolas" panose="020B0609020204030204" pitchFamily="49" charset="0"/>
+                <a:cs typeface="Consolas" panose="020B0609020204030204" pitchFamily="49" charset="0"/>
+              </a:rPr>
+              <a:t>val1</a:t>
+            </a:r>
+            <a:r>
+              <a:rPr lang="en-US" dirty="0">
+                <a:solidFill>
+                  <a:srgbClr val="CC7832"/>
+                </a:solidFill>
+                <a:effectLst/>
+                <a:latin typeface="Consolas" panose="020B0609020204030204" pitchFamily="49" charset="0"/>
+                <a:cs typeface="Consolas" panose="020B0609020204030204" pitchFamily="49" charset="0"/>
+              </a:rPr>
+              <a:t>, double </a:t>
+            </a:r>
+            <a:r>
+              <a:rPr lang="en-US" i="1" dirty="0">
+                <a:solidFill>
+                  <a:srgbClr val="9876AA"/>
+                </a:solidFill>
+                <a:effectLst/>
+                <a:latin typeface="Consolas" panose="020B0609020204030204" pitchFamily="49" charset="0"/>
+                <a:cs typeface="Consolas" panose="020B0609020204030204" pitchFamily="49" charset="0"/>
+              </a:rPr>
+              <a:t>val2</a:t>
+            </a:r>
+            <a:r>
+              <a:rPr lang="en-US" dirty="0">
+                <a:latin typeface="Consolas" panose="020B0609020204030204" pitchFamily="49" charset="0"/>
+                <a:cs typeface="Consolas" panose="020B0609020204030204" pitchFamily="49" charset="0"/>
+              </a:rPr>
+              <a:t>) {</a:t>
+            </a:r>
+            <a:br>
+              <a:rPr lang="en-US" dirty="0">
+                <a:latin typeface="Consolas" panose="020B0609020204030204" pitchFamily="49" charset="0"/>
+                <a:cs typeface="Consolas" panose="020B0609020204030204" pitchFamily="49" charset="0"/>
+              </a:rPr>
+            </a:br>
+            <a:r>
+              <a:rPr lang="en-US" dirty="0">
+                <a:latin typeface="Consolas" panose="020B0609020204030204" pitchFamily="49" charset="0"/>
+                <a:cs typeface="Consolas" panose="020B0609020204030204" pitchFamily="49" charset="0"/>
+              </a:rPr>
+              <a:t>    </a:t>
+            </a:r>
+            <a:r>
+              <a:rPr lang="en-US" dirty="0">
+                <a:solidFill>
+                  <a:srgbClr val="CC7832"/>
+                </a:solidFill>
+                <a:effectLst/>
+                <a:latin typeface="Consolas" panose="020B0609020204030204" pitchFamily="49" charset="0"/>
+                <a:cs typeface="Consolas" panose="020B0609020204030204" pitchFamily="49" charset="0"/>
+              </a:rPr>
+              <a:t>return </a:t>
+            </a:r>
+            <a:r>
+              <a:rPr lang="en-US" dirty="0">
+                <a:solidFill>
+                  <a:srgbClr val="6897BB"/>
+                </a:solidFill>
+                <a:effectLst/>
+                <a:latin typeface="Consolas" panose="020B0609020204030204" pitchFamily="49" charset="0"/>
+                <a:cs typeface="Consolas" panose="020B0609020204030204" pitchFamily="49" charset="0"/>
+              </a:rPr>
+              <a:t>0</a:t>
+            </a:r>
+            <a:r>
+              <a:rPr lang="en-US" dirty="0">
+                <a:solidFill>
+                  <a:srgbClr val="CC7832"/>
+                </a:solidFill>
+                <a:effectLst/>
+                <a:latin typeface="Consolas" panose="020B0609020204030204" pitchFamily="49" charset="0"/>
+                <a:cs typeface="Consolas" panose="020B0609020204030204" pitchFamily="49" charset="0"/>
+              </a:rPr>
+              <a:t>; </a:t>
+            </a:r>
+            <a:r>
+              <a:rPr lang="en-US" dirty="0">
+                <a:solidFill>
+                  <a:srgbClr val="808080"/>
+                </a:solidFill>
+                <a:effectLst/>
+                <a:latin typeface="Consolas" panose="020B0609020204030204" pitchFamily="49" charset="0"/>
+                <a:cs typeface="Consolas" panose="020B0609020204030204" pitchFamily="49" charset="0"/>
+              </a:rPr>
+              <a:t>// TODO: see comments above</a:t>
+            </a:r>
+            <a:br>
+              <a:rPr lang="en-US" dirty="0">
+                <a:solidFill>
+                  <a:srgbClr val="808080"/>
+                </a:solidFill>
+                <a:effectLst/>
+                <a:latin typeface="Consolas" panose="020B0609020204030204" pitchFamily="49" charset="0"/>
+                <a:cs typeface="Consolas" panose="020B0609020204030204" pitchFamily="49" charset="0"/>
+              </a:rPr>
+            </a:br>
+            <a:r>
+              <a:rPr lang="en-US" dirty="0">
+                <a:latin typeface="Consolas" panose="020B0609020204030204" pitchFamily="49" charset="0"/>
+                <a:cs typeface="Consolas" panose="020B0609020204030204" pitchFamily="49" charset="0"/>
+              </a:rPr>
+              <a:t>}</a:t>
+            </a:r>
+            <a:br>
               <a:rPr lang="en-US" dirty="0"/>
-              <a:t>Public static </a:t>
-            </a:r>
-            <a:r>
-              <a:rPr lang="en-US" dirty="0" err="1"/>
-              <a:t>my_method</a:t>
-            </a:r>
-            <a:r>
-              <a:rPr lang="en-US" dirty="0"/>
-              <a:t>(int x, boolean y) {}</a:t>
-            </a:r>
-          </a:p>
-          <a:p>
-            <a:pPr>
-              <a:buFont typeface="+mj-lt"/>
-              <a:buAutoNum type="alphaUcPeriod"/>
-            </a:pPr>
-            <a:r>
-              <a:rPr lang="en-US" dirty="0"/>
-              <a:t>public static void main(String </a:t>
-            </a:r>
-            <a:r>
-              <a:rPr lang="en-US" dirty="0" err="1"/>
-              <a:t>args</a:t>
-            </a:r>
-            <a:r>
-              <a:rPr lang="en-US" dirty="0"/>
-              <a:t>[]); </a:t>
-            </a:r>
-          </a:p>
-          <a:p>
-            <a:pPr>
-              <a:buFont typeface="+mj-lt"/>
-              <a:buAutoNum type="alphaUcPeriod"/>
-            </a:pPr>
-            <a:r>
-              <a:rPr lang="en-US" dirty="0"/>
-              <a:t> All listed</a:t>
-            </a:r>
-          </a:p>
-          <a:p>
-            <a:pPr>
-              <a:buFont typeface="+mj-lt"/>
-              <a:buAutoNum type="alphaUcPeriod"/>
-            </a:pPr>
-            <a:r>
-              <a:rPr lang="en-US" dirty="0"/>
-              <a:t> None listed </a:t>
-            </a:r>
-          </a:p>
-          <a:p>
+            </a:br>
             <a:endParaRPr lang="en-US" dirty="0"/>
+          </a:p>
+        </p:txBody>
+      </p:sp>
+      <p:sp>
+        <p:nvSpPr>
+          <p:cNvPr id="8" name="Left Arrow 7">
+            <a:extLst>
+              <a:ext uri="{FF2B5EF4-FFF2-40B4-BE49-F238E27FC236}">
+                <a16:creationId xmlns:a16="http://schemas.microsoft.com/office/drawing/2014/main" id="{40F5B08E-E543-6D4D-A32B-A7C7DC8CF326}"/>
+              </a:ext>
+            </a:extLst>
+          </p:cNvPr>
+          <p:cNvSpPr/>
+          <p:nvPr/>
+        </p:nvSpPr>
+        <p:spPr>
+          <a:xfrm rot="625571">
+            <a:off x="9897815" y="6153640"/>
+            <a:ext cx="3713171" cy="818848"/>
+          </a:xfrm>
+          <a:prstGeom prst="leftArrow">
+            <a:avLst/>
+          </a:prstGeom>
+          <a:solidFill>
+            <a:schemeClr val="tx2"/>
+          </a:solidFill>
+          <a:ln>
+            <a:noFill/>
+          </a:ln>
+          <a:effectLst/>
+        </p:spPr>
+        <p:style>
+          <a:lnRef idx="1">
+            <a:schemeClr val="accent1"/>
+          </a:lnRef>
+          <a:fillRef idx="3">
+            <a:schemeClr val="accent1"/>
+          </a:fillRef>
+          <a:effectRef idx="2">
+            <a:schemeClr val="accent1"/>
+          </a:effectRef>
+          <a:fontRef idx="minor">
+            <a:schemeClr val="lt1"/>
+          </a:fontRef>
+        </p:style>
+        <p:txBody>
+          <a:bodyPr lIns="274320" tIns="182880" rIns="274320" bIns="182880" rtlCol="0" anchor="ctr"/>
+          <a:lstStyle/>
+          <a:p>
+            <a:pPr algn="ctr"/>
+            <a:r>
+              <a:rPr lang="en-US" dirty="0">
+                <a:solidFill>
+                  <a:schemeClr val="bg1"/>
+                </a:solidFill>
+              </a:rPr>
+              <a:t>Called a method stub!</a:t>
+            </a:r>
           </a:p>
         </p:txBody>
       </p:sp>
     </p:spTree>
     <p:extLst>
       <p:ext uri="{BB962C8B-B14F-4D97-AF65-F5344CB8AC3E}">
-        <p14:creationId xmlns:p14="http://schemas.microsoft.com/office/powerpoint/2010/main" val="547128411"/>
+        <p14:creationId xmlns:p14="http://schemas.microsoft.com/office/powerpoint/2010/main" val="3150544655"/>
       </p:ext>
     </p:extLst>
   </p:cSld>
@@ -18466,81 +18748,6 @@
       </p:transition>
     </mc:Fallback>
   </mc:AlternateContent>
-  <p:timing>
-    <p:tnLst>
-      <p:par>
-        <p:cTn id="1" dur="indefinite" restart="never" nodeType="tmRoot">
-          <p:childTnLst>
-            <p:seq concurrent="1" nextAc="seek">
-              <p:cTn id="2" dur="indefinite" nodeType="mainSeq">
-                <p:childTnLst>
-                  <p:par>
-                    <p:cTn id="3" fill="hold">
-                      <p:stCondLst>
-                        <p:cond delay="indefinite"/>
-                      </p:stCondLst>
-                      <p:childTnLst>
-                        <p:par>
-                          <p:cTn id="4" fill="hold">
-                            <p:stCondLst>
-                              <p:cond delay="0"/>
-                            </p:stCondLst>
-                            <p:childTnLst>
-                              <p:par>
-                                <p:cTn id="5" presetID="3" presetClass="emph" presetSubtype="2" fill="hold" nodeType="clickEffect">
-                                  <p:stCondLst>
-                                    <p:cond delay="0"/>
-                                  </p:stCondLst>
-                                  <p:childTnLst>
-                                    <p:animClr clrSpc="rgb" dir="cw">
-                                      <p:cBhvr override="childStyle">
-                                        <p:cTn id="6" dur="2000" fill="hold"/>
-                                        <p:tgtEl>
-                                          <p:spTgt spid="3">
-                                            <p:txEl>
-                                              <p:pRg st="1" end="1"/>
-                                            </p:txEl>
-                                          </p:spTgt>
-                                        </p:tgtEl>
-                                        <p:attrNameLst>
-                                          <p:attrName>style.color</p:attrName>
-                                        </p:attrNameLst>
-                                      </p:cBhvr>
-                                      <p:to>
-                                        <a:schemeClr val="accent1"/>
-                                      </p:to>
-                                    </p:animClr>
-                                  </p:childTnLst>
-                                </p:cTn>
-                              </p:par>
-                            </p:childTnLst>
-                          </p:cTn>
-                        </p:par>
-                      </p:childTnLst>
-                    </p:cTn>
-                  </p:par>
-                </p:childTnLst>
-              </p:cTn>
-              <p:prevCondLst>
-                <p:cond evt="onPrev" delay="0">
-                  <p:tgtEl>
-                    <p:sldTgt/>
-                  </p:tgtEl>
-                </p:cond>
-              </p:prevCondLst>
-              <p:nextCondLst>
-                <p:cond evt="onNext" delay="0">
-                  <p:tgtEl>
-                    <p:sldTgt/>
-                  </p:tgtEl>
-                </p:cond>
-              </p:nextCondLst>
-            </p:seq>
-          </p:childTnLst>
-        </p:cTn>
-      </p:par>
-    </p:tnLst>
-  </p:timing>
 </p:sld>
 </file>
 

</xml_diff>